<commit_message>
added colour blindness test
</commit_message>
<xml_diff>
--- a/images/instructions/instructions.pptx
+++ b/images/instructions/instructions.pptx
@@ -6,11 +6,12 @@
   </p:sldMasterIdLst>
   <p:sldIdLst>
     <p:sldId id="256" r:id="rId2"/>
-    <p:sldId id="257" r:id="rId3"/>
-    <p:sldId id="258" r:id="rId4"/>
-    <p:sldId id="259" r:id="rId5"/>
-    <p:sldId id="260" r:id="rId6"/>
-    <p:sldId id="261" r:id="rId7"/>
+    <p:sldId id="262" r:id="rId3"/>
+    <p:sldId id="257" r:id="rId4"/>
+    <p:sldId id="258" r:id="rId5"/>
+    <p:sldId id="259" r:id="rId6"/>
+    <p:sldId id="260" r:id="rId7"/>
+    <p:sldId id="261" r:id="rId8"/>
   </p:sldIdLst>
   <p:sldSz cx="9144000" cy="6858000" type="screen4x3"/>
   <p:notesSz cx="6858000" cy="9144000"/>
@@ -109,6 +110,11 @@
       </a:defRPr>
     </a:lvl9pPr>
   </p:defaultTextStyle>
+  <p:extLst>
+    <p:ext uri="{EFAFB233-063F-42B5-8137-9DF3F51BA10A}">
+      <p15:sldGuideLst xmlns:p15="http://schemas.microsoft.com/office/powerpoint/2012/main"/>
+    </p:ext>
+  </p:extLst>
 </p:presentation>
 </file>
 
@@ -243,7 +249,7 @@
           <a:p>
             <a:fld id="{E4A4F39D-5229-437F-8485-17CB22BA73AE}" type="datetimeFigureOut">
               <a:rPr lang="en-CA" smtClean="0"/>
-              <a:t>05/03/2018</a:t>
+              <a:t>15/03/2018</a:t>
             </a:fld>
             <a:endParaRPr lang="en-CA"/>
           </a:p>
@@ -413,7 +419,7 @@
           <a:p>
             <a:fld id="{E4A4F39D-5229-437F-8485-17CB22BA73AE}" type="datetimeFigureOut">
               <a:rPr lang="en-CA" smtClean="0"/>
-              <a:t>05/03/2018</a:t>
+              <a:t>15/03/2018</a:t>
             </a:fld>
             <a:endParaRPr lang="en-CA"/>
           </a:p>
@@ -593,7 +599,7 @@
           <a:p>
             <a:fld id="{E4A4F39D-5229-437F-8485-17CB22BA73AE}" type="datetimeFigureOut">
               <a:rPr lang="en-CA" smtClean="0"/>
-              <a:t>05/03/2018</a:t>
+              <a:t>15/03/2018</a:t>
             </a:fld>
             <a:endParaRPr lang="en-CA"/>
           </a:p>
@@ -763,7 +769,7 @@
           <a:p>
             <a:fld id="{E4A4F39D-5229-437F-8485-17CB22BA73AE}" type="datetimeFigureOut">
               <a:rPr lang="en-CA" smtClean="0"/>
-              <a:t>05/03/2018</a:t>
+              <a:t>15/03/2018</a:t>
             </a:fld>
             <a:endParaRPr lang="en-CA"/>
           </a:p>
@@ -1007,7 +1013,7 @@
           <a:p>
             <a:fld id="{E4A4F39D-5229-437F-8485-17CB22BA73AE}" type="datetimeFigureOut">
               <a:rPr lang="en-CA" smtClean="0"/>
-              <a:t>05/03/2018</a:t>
+              <a:t>15/03/2018</a:t>
             </a:fld>
             <a:endParaRPr lang="en-CA"/>
           </a:p>
@@ -1239,7 +1245,7 @@
           <a:p>
             <a:fld id="{E4A4F39D-5229-437F-8485-17CB22BA73AE}" type="datetimeFigureOut">
               <a:rPr lang="en-CA" smtClean="0"/>
-              <a:t>05/03/2018</a:t>
+              <a:t>15/03/2018</a:t>
             </a:fld>
             <a:endParaRPr lang="en-CA"/>
           </a:p>
@@ -1606,7 +1612,7 @@
           <a:p>
             <a:fld id="{E4A4F39D-5229-437F-8485-17CB22BA73AE}" type="datetimeFigureOut">
               <a:rPr lang="en-CA" smtClean="0"/>
-              <a:t>05/03/2018</a:t>
+              <a:t>15/03/2018</a:t>
             </a:fld>
             <a:endParaRPr lang="en-CA"/>
           </a:p>
@@ -1724,7 +1730,7 @@
           <a:p>
             <a:fld id="{E4A4F39D-5229-437F-8485-17CB22BA73AE}" type="datetimeFigureOut">
               <a:rPr lang="en-CA" smtClean="0"/>
-              <a:t>05/03/2018</a:t>
+              <a:t>15/03/2018</a:t>
             </a:fld>
             <a:endParaRPr lang="en-CA"/>
           </a:p>
@@ -1819,7 +1825,7 @@
           <a:p>
             <a:fld id="{E4A4F39D-5229-437F-8485-17CB22BA73AE}" type="datetimeFigureOut">
               <a:rPr lang="en-CA" smtClean="0"/>
-              <a:t>05/03/2018</a:t>
+              <a:t>15/03/2018</a:t>
             </a:fld>
             <a:endParaRPr lang="en-CA"/>
           </a:p>
@@ -2096,7 +2102,7 @@
           <a:p>
             <a:fld id="{E4A4F39D-5229-437F-8485-17CB22BA73AE}" type="datetimeFigureOut">
               <a:rPr lang="en-CA" smtClean="0"/>
-              <a:t>05/03/2018</a:t>
+              <a:t>15/03/2018</a:t>
             </a:fld>
             <a:endParaRPr lang="en-CA"/>
           </a:p>
@@ -2353,7 +2359,7 @@
           <a:p>
             <a:fld id="{E4A4F39D-5229-437F-8485-17CB22BA73AE}" type="datetimeFigureOut">
               <a:rPr lang="en-CA" smtClean="0"/>
-              <a:t>05/03/2018</a:t>
+              <a:t>15/03/2018</a:t>
             </a:fld>
             <a:endParaRPr lang="en-CA"/>
           </a:p>
@@ -2566,7 +2572,7 @@
           <a:p>
             <a:fld id="{E4A4F39D-5229-437F-8485-17CB22BA73AE}" type="datetimeFigureOut">
               <a:rPr lang="en-CA" smtClean="0"/>
-              <a:t>05/03/2018</a:t>
+              <a:t>15/03/2018</a:t>
             </a:fld>
             <a:endParaRPr lang="en-CA"/>
           </a:p>
@@ -2987,8 +2993,8 @@
         </p:nvSpPr>
         <p:spPr>
           <a:xfrm>
-            <a:off x="381817" y="2274838"/>
-            <a:ext cx="8380366" cy="2308324"/>
+            <a:off x="381817" y="2828836"/>
+            <a:ext cx="8380366" cy="1200329"/>
           </a:xfrm>
           <a:prstGeom prst="rect">
             <a:avLst/>
@@ -3003,83 +3009,22 @@
           <a:p>
             <a:pPr algn="ctr"/>
             <a:r>
-              <a:rPr lang="en-CA" dirty="0">
+              <a:rPr lang="en-CA" dirty="0" smtClean="0">
                 <a:solidFill>
                   <a:schemeClr val="bg1"/>
                 </a:solidFill>
                 <a:latin typeface="Arial" panose="020B0604020202020204" pitchFamily="34" charset="0"/>
                 <a:cs typeface="Arial" panose="020B0604020202020204" pitchFamily="34" charset="0"/>
               </a:rPr>
-              <a:t>On these trials you will be shown grey line drawings.  Please indicate if you detect the line drawing by pressing the left arrow key if it’s detected and right arrow key if it’s not detected.  The next trial will begin immediately following your response.</a:t>
-            </a:r>
-          </a:p>
-          <a:p>
-            <a:pPr algn="ctr"/>
-            <a:r>
-              <a:rPr lang="en-CA" dirty="0">
-                <a:solidFill>
-                  <a:schemeClr val="bg1"/>
-                </a:solidFill>
-                <a:latin typeface="Arial" panose="020B0604020202020204" pitchFamily="34" charset="0"/>
-                <a:cs typeface="Arial" panose="020B0604020202020204" pitchFamily="34" charset="0"/>
-              </a:rPr>
-              <a:t> </a:t>
-            </a:r>
-          </a:p>
-          <a:p>
-            <a:pPr algn="ctr"/>
-            <a:r>
-              <a:rPr lang="en-CA" dirty="0">
-                <a:solidFill>
-                  <a:schemeClr val="bg1"/>
-                </a:solidFill>
-                <a:latin typeface="Arial" panose="020B0604020202020204" pitchFamily="34" charset="0"/>
-                <a:cs typeface="Arial" panose="020B0604020202020204" pitchFamily="34" charset="0"/>
-              </a:rPr>
-              <a:t>Not Detected </a:t>
-            </a:r>
-            <a:r>
-              <a:rPr lang="en-CA" dirty="0">
-                <a:solidFill>
-                  <a:schemeClr val="bg1"/>
-                </a:solidFill>
-                <a:latin typeface="Arial" panose="020B0604020202020204" pitchFamily="34" charset="0"/>
-                <a:cs typeface="Arial" panose="020B0604020202020204" pitchFamily="34" charset="0"/>
-                <a:sym typeface="Wingdings" panose="05000000000000000000" pitchFamily="2" charset="2"/>
-              </a:rPr>
-              <a:t></a:t>
-            </a:r>
-            <a:r>
-              <a:rPr lang="en-CA" dirty="0">
-                <a:solidFill>
-                  <a:schemeClr val="bg1"/>
-                </a:solidFill>
-                <a:latin typeface="Arial" panose="020B0604020202020204" pitchFamily="34" charset="0"/>
-                <a:cs typeface="Arial" panose="020B0604020202020204" pitchFamily="34" charset="0"/>
-              </a:rPr>
-              <a:t>		</a:t>
-            </a:r>
-            <a:r>
-              <a:rPr lang="en-CA" dirty="0">
-                <a:solidFill>
-                  <a:schemeClr val="bg1"/>
-                </a:solidFill>
-                <a:latin typeface="Arial" panose="020B0604020202020204" pitchFamily="34" charset="0"/>
-                <a:cs typeface="Arial" panose="020B0604020202020204" pitchFamily="34" charset="0"/>
-                <a:sym typeface="Wingdings" panose="05000000000000000000" pitchFamily="2" charset="2"/>
-              </a:rPr>
-              <a:t></a:t>
-            </a:r>
-            <a:r>
-              <a:rPr lang="en-CA" dirty="0">
-                <a:solidFill>
-                  <a:schemeClr val="bg1"/>
-                </a:solidFill>
-                <a:latin typeface="Arial" panose="020B0604020202020204" pitchFamily="34" charset="0"/>
-                <a:cs typeface="Arial" panose="020B0604020202020204" pitchFamily="34" charset="0"/>
-              </a:rPr>
-              <a:t> Detected</a:t>
-            </a:r>
+              <a:t>You will be shown 15 plates. Please enter the number you see on each plate followed by Enter key.</a:t>
+            </a:r>
+            <a:endParaRPr lang="en-CA" dirty="0">
+              <a:solidFill>
+                <a:schemeClr val="bg1"/>
+              </a:solidFill>
+              <a:latin typeface="Arial" panose="020B0604020202020204" pitchFamily="34" charset="0"/>
+              <a:cs typeface="Arial" panose="020B0604020202020204" pitchFamily="34" charset="0"/>
+            </a:endParaRPr>
           </a:p>
           <a:p>
             <a:pPr algn="ctr"/>
@@ -3152,8 +3097,8 @@
         </p:nvSpPr>
         <p:spPr>
           <a:xfrm>
-            <a:off x="381817" y="2690336"/>
-            <a:ext cx="8380366" cy="1477328"/>
+            <a:off x="381817" y="2274838"/>
+            <a:ext cx="8380366" cy="2308324"/>
           </a:xfrm>
           <a:prstGeom prst="rect">
             <a:avLst/>
@@ -3175,7 +3120,75 @@
                 <a:latin typeface="Arial" panose="020B0604020202020204" pitchFamily="34" charset="0"/>
                 <a:cs typeface="Arial" panose="020B0604020202020204" pitchFamily="34" charset="0"/>
               </a:rPr>
-              <a:t>On these trials you will be shown flickering line drawings.  Use the up and down arrow keys to adjust the flicker until it is no longer detected. The next trial will begin immediately following your response.</a:t>
+              <a:t>On these trials you will be shown grey line drawings.  Please indicate if you detect the line drawing by pressing the left arrow key if it’s detected and right arrow key if it’s not detected.  The next trial will begin immediately following your response.</a:t>
+            </a:r>
+          </a:p>
+          <a:p>
+            <a:pPr algn="ctr"/>
+            <a:r>
+              <a:rPr lang="en-CA" dirty="0">
+                <a:solidFill>
+                  <a:schemeClr val="bg1"/>
+                </a:solidFill>
+                <a:latin typeface="Arial" panose="020B0604020202020204" pitchFamily="34" charset="0"/>
+                <a:cs typeface="Arial" panose="020B0604020202020204" pitchFamily="34" charset="0"/>
+              </a:rPr>
+              <a:t> </a:t>
+            </a:r>
+          </a:p>
+          <a:p>
+            <a:pPr algn="ctr"/>
+            <a:r>
+              <a:rPr lang="en-CA" dirty="0">
+                <a:solidFill>
+                  <a:schemeClr val="bg1"/>
+                </a:solidFill>
+                <a:latin typeface="Arial" panose="020B0604020202020204" pitchFamily="34" charset="0"/>
+                <a:cs typeface="Arial" panose="020B0604020202020204" pitchFamily="34" charset="0"/>
+              </a:rPr>
+              <a:t>Not Detected </a:t>
+            </a:r>
+            <a:r>
+              <a:rPr lang="en-CA" dirty="0">
+                <a:solidFill>
+                  <a:schemeClr val="bg1"/>
+                </a:solidFill>
+                <a:latin typeface="Arial" panose="020B0604020202020204" pitchFamily="34" charset="0"/>
+                <a:cs typeface="Arial" panose="020B0604020202020204" pitchFamily="34" charset="0"/>
+                <a:sym typeface="Wingdings" panose="05000000000000000000" pitchFamily="2" charset="2"/>
+              </a:rPr>
+              <a:t></a:t>
+            </a:r>
+            <a:r>
+              <a:rPr lang="en-CA" dirty="0">
+                <a:solidFill>
+                  <a:schemeClr val="bg1"/>
+                </a:solidFill>
+                <a:latin typeface="Arial" panose="020B0604020202020204" pitchFamily="34" charset="0"/>
+                <a:cs typeface="Arial" panose="020B0604020202020204" pitchFamily="34" charset="0"/>
+              </a:rPr>
+              <a:t>		</a:t>
+            </a:r>
+            <a:r>
+              <a:rPr lang="en-CA" dirty="0">
+                <a:solidFill>
+                  <a:schemeClr val="bg1"/>
+                </a:solidFill>
+                <a:latin typeface="Arial" panose="020B0604020202020204" pitchFamily="34" charset="0"/>
+                <a:cs typeface="Arial" panose="020B0604020202020204" pitchFamily="34" charset="0"/>
+                <a:sym typeface="Wingdings" panose="05000000000000000000" pitchFamily="2" charset="2"/>
+              </a:rPr>
+              <a:t></a:t>
+            </a:r>
+            <a:r>
+              <a:rPr lang="en-CA" dirty="0">
+                <a:solidFill>
+                  <a:schemeClr val="bg1"/>
+                </a:solidFill>
+                <a:latin typeface="Arial" panose="020B0604020202020204" pitchFamily="34" charset="0"/>
+                <a:cs typeface="Arial" panose="020B0604020202020204" pitchFamily="34" charset="0"/>
+              </a:rPr>
+              <a:t> Detected</a:t>
             </a:r>
           </a:p>
           <a:p>
@@ -3206,7 +3219,7 @@
     </p:spTree>
     <p:extLst>
       <p:ext uri="{BB962C8B-B14F-4D97-AF65-F5344CB8AC3E}">
-        <p14:creationId xmlns:p14="http://schemas.microsoft.com/office/powerpoint/2010/main" val="3165654284"/>
+        <p14:creationId xmlns:p14="http://schemas.microsoft.com/office/powerpoint/2010/main" val="1461961124"/>
       </p:ext>
     </p:extLst>
   </p:cSld>
@@ -3249,8 +3262,8 @@
         </p:nvSpPr>
         <p:spPr>
           <a:xfrm>
-            <a:off x="381817" y="2413338"/>
-            <a:ext cx="8380366" cy="2031325"/>
+            <a:off x="381817" y="2690336"/>
+            <a:ext cx="8380366" cy="1477328"/>
           </a:xfrm>
           <a:prstGeom prst="rect">
             <a:avLst/>
@@ -3272,7 +3285,7 @@
                 <a:latin typeface="Arial" panose="020B0604020202020204" pitchFamily="34" charset="0"/>
                 <a:cs typeface="Arial" panose="020B0604020202020204" pitchFamily="34" charset="0"/>
               </a:rPr>
-              <a:t>On each trial you will be presented with a letter stimulus.  Your task is to indicate the letter you first see on the screen.</a:t>
+              <a:t>On these trials you will be shown flickering line drawings.  Use the up and down arrow keys to adjust the flicker until it is no longer detected. The next trial will begin immediately following your response.</a:t>
             </a:r>
           </a:p>
           <a:p>
@@ -3295,29 +3308,6 @@
                 <a:latin typeface="Arial" panose="020B0604020202020204" pitchFamily="34" charset="0"/>
                 <a:cs typeface="Arial" panose="020B0604020202020204" pitchFamily="34" charset="0"/>
               </a:rPr>
-              <a:t>Two response options will be shown immediately following the stimulus.  Press the left or right arrow key corresponding with your response.</a:t>
-            </a:r>
-          </a:p>
-          <a:p>
-            <a:pPr algn="ctr"/>
-            <a:endParaRPr lang="en-CA" dirty="0">
-              <a:solidFill>
-                <a:schemeClr val="bg1"/>
-              </a:solidFill>
-              <a:latin typeface="Arial" panose="020B0604020202020204" pitchFamily="34" charset="0"/>
-              <a:cs typeface="Arial" panose="020B0604020202020204" pitchFamily="34" charset="0"/>
-            </a:endParaRPr>
-          </a:p>
-          <a:p>
-            <a:pPr algn="ctr"/>
-            <a:r>
-              <a:rPr lang="en-CA" dirty="0">
-                <a:solidFill>
-                  <a:schemeClr val="bg1"/>
-                </a:solidFill>
-                <a:latin typeface="Arial" panose="020B0604020202020204" pitchFamily="34" charset="0"/>
-                <a:cs typeface="Arial" panose="020B0604020202020204" pitchFamily="34" charset="0"/>
-              </a:rPr>
               <a:t>Press the spacebar to begin</a:t>
             </a:r>
           </a:p>
@@ -3326,7 +3316,7 @@
     </p:spTree>
     <p:extLst>
       <p:ext uri="{BB962C8B-B14F-4D97-AF65-F5344CB8AC3E}">
-        <p14:creationId xmlns:p14="http://schemas.microsoft.com/office/powerpoint/2010/main" val="1799043823"/>
+        <p14:creationId xmlns:p14="http://schemas.microsoft.com/office/powerpoint/2010/main" val="3165654284"/>
       </p:ext>
     </p:extLst>
   </p:cSld>
@@ -3392,47 +3382,7 @@
                 <a:latin typeface="Arial" panose="020B0604020202020204" pitchFamily="34" charset="0"/>
                 <a:cs typeface="Arial" panose="020B0604020202020204" pitchFamily="34" charset="0"/>
               </a:rPr>
-              <a:t>On each trial you will be presented with a letter stimulus.  Press the left arrow key if you see the letter </a:t>
-            </a:r>
-            <a:r>
-              <a:rPr lang="en-CA" dirty="0" smtClean="0">
-                <a:solidFill>
-                  <a:schemeClr val="bg1"/>
-                </a:solidFill>
-                <a:latin typeface="Arial" panose="020B0604020202020204" pitchFamily="34" charset="0"/>
-                <a:cs typeface="Arial" panose="020B0604020202020204" pitchFamily="34" charset="0"/>
-              </a:rPr>
-              <a:t>‘H’ </a:t>
-            </a:r>
-            <a:r>
-              <a:rPr lang="en-CA" dirty="0">
-                <a:solidFill>
-                  <a:schemeClr val="bg1"/>
-                </a:solidFill>
-                <a:latin typeface="Arial" panose="020B0604020202020204" pitchFamily="34" charset="0"/>
-                <a:cs typeface="Arial" panose="020B0604020202020204" pitchFamily="34" charset="0"/>
-              </a:rPr>
-              <a:t>and the right arrow key if you do not see the letter </a:t>
-            </a:r>
-            <a:r>
-              <a:rPr lang="en-CA" dirty="0" smtClean="0">
-                <a:solidFill>
-                  <a:schemeClr val="bg1"/>
-                </a:solidFill>
-                <a:latin typeface="Arial" panose="020B0604020202020204" pitchFamily="34" charset="0"/>
-                <a:cs typeface="Arial" panose="020B0604020202020204" pitchFamily="34" charset="0"/>
-              </a:rPr>
-              <a:t>‘H’ </a:t>
-            </a:r>
-            <a:r>
-              <a:rPr lang="en-CA" dirty="0">
-                <a:solidFill>
-                  <a:schemeClr val="bg1"/>
-                </a:solidFill>
-                <a:latin typeface="Arial" panose="020B0604020202020204" pitchFamily="34" charset="0"/>
-                <a:cs typeface="Arial" panose="020B0604020202020204" pitchFamily="34" charset="0"/>
-              </a:rPr>
-              <a:t>displayed on each trial.  Please answer as quickly and accurately as possible.</a:t>
+              <a:t>On each trial you will be presented with a letter stimulus.  Your task is to indicate the letter you first see on the screen.</a:t>
             </a:r>
           </a:p>
           <a:p>
@@ -3448,64 +3398,15 @@
           <a:p>
             <a:pPr algn="ctr"/>
             <a:r>
-              <a:rPr lang="en-CA" dirty="0" smtClean="0">
+              <a:rPr lang="en-CA" dirty="0">
                 <a:solidFill>
                   <a:schemeClr val="bg1"/>
                 </a:solidFill>
                 <a:latin typeface="Arial" panose="020B0604020202020204" pitchFamily="34" charset="0"/>
                 <a:cs typeface="Arial" panose="020B0604020202020204" pitchFamily="34" charset="0"/>
               </a:rPr>
-              <a:t>Not Present </a:t>
-            </a:r>
-            <a:r>
-              <a:rPr lang="en-CA" dirty="0" smtClean="0">
-                <a:solidFill>
-                  <a:schemeClr val="bg1"/>
-                </a:solidFill>
-                <a:latin typeface="Arial" panose="020B0604020202020204" pitchFamily="34" charset="0"/>
-                <a:cs typeface="Arial" panose="020B0604020202020204" pitchFamily="34" charset="0"/>
-                <a:sym typeface="Wingdings" panose="05000000000000000000" pitchFamily="2" charset="2"/>
-              </a:rPr>
-              <a:t></a:t>
-            </a:r>
-            <a:r>
-              <a:rPr lang="en-CA" dirty="0">
-                <a:solidFill>
-                  <a:schemeClr val="bg1"/>
-                </a:solidFill>
-                <a:latin typeface="Arial" panose="020B0604020202020204" pitchFamily="34" charset="0"/>
-                <a:cs typeface="Arial" panose="020B0604020202020204" pitchFamily="34" charset="0"/>
-              </a:rPr>
-              <a:t>		</a:t>
-            </a:r>
-            <a:r>
-              <a:rPr lang="en-CA" dirty="0" smtClean="0">
-                <a:solidFill>
-                  <a:schemeClr val="bg1"/>
-                </a:solidFill>
-                <a:latin typeface="Arial" panose="020B0604020202020204" pitchFamily="34" charset="0"/>
-                <a:cs typeface="Arial" panose="020B0604020202020204" pitchFamily="34" charset="0"/>
-                <a:sym typeface="Wingdings" panose="05000000000000000000" pitchFamily="2" charset="2"/>
-              </a:rPr>
-              <a:t></a:t>
-            </a:r>
-            <a:r>
-              <a:rPr lang="en-CA" dirty="0" smtClean="0">
-                <a:solidFill>
-                  <a:schemeClr val="bg1"/>
-                </a:solidFill>
-                <a:latin typeface="Arial" panose="020B0604020202020204" pitchFamily="34" charset="0"/>
-                <a:cs typeface="Arial" panose="020B0604020202020204" pitchFamily="34" charset="0"/>
-              </a:rPr>
-              <a:t> Present</a:t>
-            </a:r>
-            <a:endParaRPr lang="en-CA" dirty="0">
-              <a:solidFill>
-                <a:schemeClr val="bg1"/>
-              </a:solidFill>
-              <a:latin typeface="Arial" panose="020B0604020202020204" pitchFamily="34" charset="0"/>
-              <a:cs typeface="Arial" panose="020B0604020202020204" pitchFamily="34" charset="0"/>
-            </a:endParaRPr>
+              <a:t>Two response options will be shown immediately following the stimulus.  Press the left or right arrow key corresponding with your response.</a:t>
+            </a:r>
           </a:p>
           <a:p>
             <a:pPr algn="ctr"/>
@@ -3535,7 +3436,7 @@
     </p:spTree>
     <p:extLst>
       <p:ext uri="{BB962C8B-B14F-4D97-AF65-F5344CB8AC3E}">
-        <p14:creationId xmlns:p14="http://schemas.microsoft.com/office/powerpoint/2010/main" val="1241897964"/>
+        <p14:creationId xmlns:p14="http://schemas.microsoft.com/office/powerpoint/2010/main" val="1799043823"/>
       </p:ext>
     </p:extLst>
   </p:cSld>
@@ -3578,6 +3479,215 @@
         </p:nvSpPr>
         <p:spPr>
           <a:xfrm>
+            <a:off x="381817" y="2413338"/>
+            <a:ext cx="8380366" cy="2031325"/>
+          </a:xfrm>
+          <a:prstGeom prst="rect">
+            <a:avLst/>
+          </a:prstGeom>
+          <a:noFill/>
+        </p:spPr>
+        <p:txBody>
+          <a:bodyPr wrap="square" rtlCol="0">
+            <a:spAutoFit/>
+          </a:bodyPr>
+          <a:lstStyle/>
+          <a:p>
+            <a:pPr algn="ctr"/>
+            <a:r>
+              <a:rPr lang="en-CA" dirty="0">
+                <a:solidFill>
+                  <a:schemeClr val="bg1"/>
+                </a:solidFill>
+                <a:latin typeface="Arial" panose="020B0604020202020204" pitchFamily="34" charset="0"/>
+                <a:cs typeface="Arial" panose="020B0604020202020204" pitchFamily="34" charset="0"/>
+              </a:rPr>
+              <a:t>On each trial you will be presented with a letter stimulus.  Press the left arrow key if you see the letter </a:t>
+            </a:r>
+            <a:r>
+              <a:rPr lang="en-CA" dirty="0" smtClean="0">
+                <a:solidFill>
+                  <a:schemeClr val="bg1"/>
+                </a:solidFill>
+                <a:latin typeface="Arial" panose="020B0604020202020204" pitchFamily="34" charset="0"/>
+                <a:cs typeface="Arial" panose="020B0604020202020204" pitchFamily="34" charset="0"/>
+              </a:rPr>
+              <a:t>‘H’ </a:t>
+            </a:r>
+            <a:r>
+              <a:rPr lang="en-CA" dirty="0">
+                <a:solidFill>
+                  <a:schemeClr val="bg1"/>
+                </a:solidFill>
+                <a:latin typeface="Arial" panose="020B0604020202020204" pitchFamily="34" charset="0"/>
+                <a:cs typeface="Arial" panose="020B0604020202020204" pitchFamily="34" charset="0"/>
+              </a:rPr>
+              <a:t>and the right arrow key if you do not see the letter </a:t>
+            </a:r>
+            <a:r>
+              <a:rPr lang="en-CA" dirty="0" smtClean="0">
+                <a:solidFill>
+                  <a:schemeClr val="bg1"/>
+                </a:solidFill>
+                <a:latin typeface="Arial" panose="020B0604020202020204" pitchFamily="34" charset="0"/>
+                <a:cs typeface="Arial" panose="020B0604020202020204" pitchFamily="34" charset="0"/>
+              </a:rPr>
+              <a:t>‘H’ </a:t>
+            </a:r>
+            <a:r>
+              <a:rPr lang="en-CA" dirty="0">
+                <a:solidFill>
+                  <a:schemeClr val="bg1"/>
+                </a:solidFill>
+                <a:latin typeface="Arial" panose="020B0604020202020204" pitchFamily="34" charset="0"/>
+                <a:cs typeface="Arial" panose="020B0604020202020204" pitchFamily="34" charset="0"/>
+              </a:rPr>
+              <a:t>displayed on each trial.  Please answer as quickly and accurately as possible.</a:t>
+            </a:r>
+          </a:p>
+          <a:p>
+            <a:pPr algn="ctr"/>
+            <a:endParaRPr lang="en-CA" dirty="0">
+              <a:solidFill>
+                <a:schemeClr val="bg1"/>
+              </a:solidFill>
+              <a:latin typeface="Arial" panose="020B0604020202020204" pitchFamily="34" charset="0"/>
+              <a:cs typeface="Arial" panose="020B0604020202020204" pitchFamily="34" charset="0"/>
+            </a:endParaRPr>
+          </a:p>
+          <a:p>
+            <a:pPr algn="ctr"/>
+            <a:r>
+              <a:rPr lang="en-CA" dirty="0" smtClean="0">
+                <a:solidFill>
+                  <a:schemeClr val="bg1"/>
+                </a:solidFill>
+                <a:latin typeface="Arial" panose="020B0604020202020204" pitchFamily="34" charset="0"/>
+                <a:cs typeface="Arial" panose="020B0604020202020204" pitchFamily="34" charset="0"/>
+              </a:rPr>
+              <a:t>Not Present </a:t>
+            </a:r>
+            <a:r>
+              <a:rPr lang="en-CA" dirty="0" smtClean="0">
+                <a:solidFill>
+                  <a:schemeClr val="bg1"/>
+                </a:solidFill>
+                <a:latin typeface="Arial" panose="020B0604020202020204" pitchFamily="34" charset="0"/>
+                <a:cs typeface="Arial" panose="020B0604020202020204" pitchFamily="34" charset="0"/>
+                <a:sym typeface="Wingdings" panose="05000000000000000000" pitchFamily="2" charset="2"/>
+              </a:rPr>
+              <a:t></a:t>
+            </a:r>
+            <a:r>
+              <a:rPr lang="en-CA" dirty="0">
+                <a:solidFill>
+                  <a:schemeClr val="bg1"/>
+                </a:solidFill>
+                <a:latin typeface="Arial" panose="020B0604020202020204" pitchFamily="34" charset="0"/>
+                <a:cs typeface="Arial" panose="020B0604020202020204" pitchFamily="34" charset="0"/>
+              </a:rPr>
+              <a:t>		</a:t>
+            </a:r>
+            <a:r>
+              <a:rPr lang="en-CA" dirty="0" smtClean="0">
+                <a:solidFill>
+                  <a:schemeClr val="bg1"/>
+                </a:solidFill>
+                <a:latin typeface="Arial" panose="020B0604020202020204" pitchFamily="34" charset="0"/>
+                <a:cs typeface="Arial" panose="020B0604020202020204" pitchFamily="34" charset="0"/>
+                <a:sym typeface="Wingdings" panose="05000000000000000000" pitchFamily="2" charset="2"/>
+              </a:rPr>
+              <a:t></a:t>
+            </a:r>
+            <a:r>
+              <a:rPr lang="en-CA" dirty="0" smtClean="0">
+                <a:solidFill>
+                  <a:schemeClr val="bg1"/>
+                </a:solidFill>
+                <a:latin typeface="Arial" panose="020B0604020202020204" pitchFamily="34" charset="0"/>
+                <a:cs typeface="Arial" panose="020B0604020202020204" pitchFamily="34" charset="0"/>
+              </a:rPr>
+              <a:t> Present</a:t>
+            </a:r>
+            <a:endParaRPr lang="en-CA" dirty="0">
+              <a:solidFill>
+                <a:schemeClr val="bg1"/>
+              </a:solidFill>
+              <a:latin typeface="Arial" panose="020B0604020202020204" pitchFamily="34" charset="0"/>
+              <a:cs typeface="Arial" panose="020B0604020202020204" pitchFamily="34" charset="0"/>
+            </a:endParaRPr>
+          </a:p>
+          <a:p>
+            <a:pPr algn="ctr"/>
+            <a:endParaRPr lang="en-CA" dirty="0">
+              <a:solidFill>
+                <a:schemeClr val="bg1"/>
+              </a:solidFill>
+              <a:latin typeface="Arial" panose="020B0604020202020204" pitchFamily="34" charset="0"/>
+              <a:cs typeface="Arial" panose="020B0604020202020204" pitchFamily="34" charset="0"/>
+            </a:endParaRPr>
+          </a:p>
+          <a:p>
+            <a:pPr algn="ctr"/>
+            <a:r>
+              <a:rPr lang="en-CA" dirty="0">
+                <a:solidFill>
+                  <a:schemeClr val="bg1"/>
+                </a:solidFill>
+                <a:latin typeface="Arial" panose="020B0604020202020204" pitchFamily="34" charset="0"/>
+                <a:cs typeface="Arial" panose="020B0604020202020204" pitchFamily="34" charset="0"/>
+              </a:rPr>
+              <a:t>Press the spacebar to begin</a:t>
+            </a:r>
+          </a:p>
+        </p:txBody>
+      </p:sp>
+    </p:spTree>
+    <p:extLst>
+      <p:ext uri="{BB962C8B-B14F-4D97-AF65-F5344CB8AC3E}">
+        <p14:creationId xmlns:p14="http://schemas.microsoft.com/office/powerpoint/2010/main" val="1241897964"/>
+      </p:ext>
+    </p:extLst>
+  </p:cSld>
+  <p:clrMapOvr>
+    <a:masterClrMapping/>
+  </p:clrMapOvr>
+</p:sld>
+</file>
+
+<file path=ppt/slides/slide6.xml><?xml version="1.0" encoding="utf-8"?>
+<p:sld xmlns:a="http://schemas.openxmlformats.org/drawingml/2006/main" xmlns:r="http://schemas.openxmlformats.org/officeDocument/2006/relationships" xmlns:p="http://schemas.openxmlformats.org/presentationml/2006/main">
+  <p:cSld>
+    <p:bg>
+      <p:bgPr>
+        <a:solidFill>
+          <a:srgbClr val="808080"/>
+        </a:solidFill>
+        <a:effectLst/>
+      </p:bgPr>
+    </p:bg>
+    <p:spTree>
+      <p:nvGrpSpPr>
+        <p:cNvPr id="1" name=""/>
+        <p:cNvGrpSpPr/>
+        <p:nvPr/>
+      </p:nvGrpSpPr>
+      <p:grpSpPr>
+        <a:xfrm>
+          <a:off x="0" y="0"/>
+          <a:ext cx="0" cy="0"/>
+          <a:chOff x="0" y="0"/>
+          <a:chExt cx="0" cy="0"/>
+        </a:xfrm>
+      </p:grpSpPr>
+      <p:sp>
+        <p:nvSpPr>
+          <p:cNvPr id="4" name="TextBox 3"/>
+          <p:cNvSpPr txBox="1"/>
+          <p:nvPr/>
+        </p:nvSpPr>
+        <p:spPr>
+          <a:xfrm>
             <a:off x="381817" y="2274838"/>
             <a:ext cx="8380366" cy="1754326"/>
           </a:xfrm>
@@ -3662,7 +3772,7 @@
 </p:sld>
 </file>
 
-<file path=ppt/slides/slide6.xml><?xml version="1.0" encoding="utf-8"?>
+<file path=ppt/slides/slide7.xml><?xml version="1.0" encoding="utf-8"?>
 <p:sld xmlns:a="http://schemas.openxmlformats.org/drawingml/2006/main" xmlns:r="http://schemas.openxmlformats.org/officeDocument/2006/relationships" xmlns:p="http://schemas.openxmlformats.org/presentationml/2006/main">
   <p:cSld>
     <p:bg>

</xml_diff>

<commit_message>
lab changes, ready to run
</commit_message>
<xml_diff>
--- a/images/instructions/instructions.pptx
+++ b/images/instructions/instructions.pptx
@@ -8,10 +8,12 @@
     <p:sldId id="256" r:id="rId2"/>
     <p:sldId id="262" r:id="rId3"/>
     <p:sldId id="257" r:id="rId4"/>
-    <p:sldId id="258" r:id="rId5"/>
-    <p:sldId id="259" r:id="rId6"/>
-    <p:sldId id="260" r:id="rId7"/>
-    <p:sldId id="261" r:id="rId8"/>
+    <p:sldId id="263" r:id="rId5"/>
+    <p:sldId id="264" r:id="rId6"/>
+    <p:sldId id="258" r:id="rId7"/>
+    <p:sldId id="259" r:id="rId8"/>
+    <p:sldId id="260" r:id="rId9"/>
+    <p:sldId id="261" r:id="rId10"/>
   </p:sldIdLst>
   <p:sldSz cx="9144000" cy="6858000" type="screen4x3"/>
   <p:notesSz cx="6858000" cy="9144000"/>
@@ -249,7 +251,7 @@
           <a:p>
             <a:fld id="{E4A4F39D-5229-437F-8485-17CB22BA73AE}" type="datetimeFigureOut">
               <a:rPr lang="en-CA" smtClean="0"/>
-              <a:t>15/03/2018</a:t>
+              <a:t>19/03/2018</a:t>
             </a:fld>
             <a:endParaRPr lang="en-CA"/>
           </a:p>
@@ -419,7 +421,7 @@
           <a:p>
             <a:fld id="{E4A4F39D-5229-437F-8485-17CB22BA73AE}" type="datetimeFigureOut">
               <a:rPr lang="en-CA" smtClean="0"/>
-              <a:t>15/03/2018</a:t>
+              <a:t>19/03/2018</a:t>
             </a:fld>
             <a:endParaRPr lang="en-CA"/>
           </a:p>
@@ -599,7 +601,7 @@
           <a:p>
             <a:fld id="{E4A4F39D-5229-437F-8485-17CB22BA73AE}" type="datetimeFigureOut">
               <a:rPr lang="en-CA" smtClean="0"/>
-              <a:t>15/03/2018</a:t>
+              <a:t>19/03/2018</a:t>
             </a:fld>
             <a:endParaRPr lang="en-CA"/>
           </a:p>
@@ -769,7 +771,7 @@
           <a:p>
             <a:fld id="{E4A4F39D-5229-437F-8485-17CB22BA73AE}" type="datetimeFigureOut">
               <a:rPr lang="en-CA" smtClean="0"/>
-              <a:t>15/03/2018</a:t>
+              <a:t>19/03/2018</a:t>
             </a:fld>
             <a:endParaRPr lang="en-CA"/>
           </a:p>
@@ -1013,7 +1015,7 @@
           <a:p>
             <a:fld id="{E4A4F39D-5229-437F-8485-17CB22BA73AE}" type="datetimeFigureOut">
               <a:rPr lang="en-CA" smtClean="0"/>
-              <a:t>15/03/2018</a:t>
+              <a:t>19/03/2018</a:t>
             </a:fld>
             <a:endParaRPr lang="en-CA"/>
           </a:p>
@@ -1245,7 +1247,7 @@
           <a:p>
             <a:fld id="{E4A4F39D-5229-437F-8485-17CB22BA73AE}" type="datetimeFigureOut">
               <a:rPr lang="en-CA" smtClean="0"/>
-              <a:t>15/03/2018</a:t>
+              <a:t>19/03/2018</a:t>
             </a:fld>
             <a:endParaRPr lang="en-CA"/>
           </a:p>
@@ -1612,7 +1614,7 @@
           <a:p>
             <a:fld id="{E4A4F39D-5229-437F-8485-17CB22BA73AE}" type="datetimeFigureOut">
               <a:rPr lang="en-CA" smtClean="0"/>
-              <a:t>15/03/2018</a:t>
+              <a:t>19/03/2018</a:t>
             </a:fld>
             <a:endParaRPr lang="en-CA"/>
           </a:p>
@@ -1730,7 +1732,7 @@
           <a:p>
             <a:fld id="{E4A4F39D-5229-437F-8485-17CB22BA73AE}" type="datetimeFigureOut">
               <a:rPr lang="en-CA" smtClean="0"/>
-              <a:t>15/03/2018</a:t>
+              <a:t>19/03/2018</a:t>
             </a:fld>
             <a:endParaRPr lang="en-CA"/>
           </a:p>
@@ -1825,7 +1827,7 @@
           <a:p>
             <a:fld id="{E4A4F39D-5229-437F-8485-17CB22BA73AE}" type="datetimeFigureOut">
               <a:rPr lang="en-CA" smtClean="0"/>
-              <a:t>15/03/2018</a:t>
+              <a:t>19/03/2018</a:t>
             </a:fld>
             <a:endParaRPr lang="en-CA"/>
           </a:p>
@@ -2102,7 +2104,7 @@
           <a:p>
             <a:fld id="{E4A4F39D-5229-437F-8485-17CB22BA73AE}" type="datetimeFigureOut">
               <a:rPr lang="en-CA" smtClean="0"/>
-              <a:t>15/03/2018</a:t>
+              <a:t>19/03/2018</a:t>
             </a:fld>
             <a:endParaRPr lang="en-CA"/>
           </a:p>
@@ -2359,7 +2361,7 @@
           <a:p>
             <a:fld id="{E4A4F39D-5229-437F-8485-17CB22BA73AE}" type="datetimeFigureOut">
               <a:rPr lang="en-CA" smtClean="0"/>
-              <a:t>15/03/2018</a:t>
+              <a:t>19/03/2018</a:t>
             </a:fld>
             <a:endParaRPr lang="en-CA"/>
           </a:p>
@@ -2572,7 +2574,7 @@
           <a:p>
             <a:fld id="{E4A4F39D-5229-437F-8485-17CB22BA73AE}" type="datetimeFigureOut">
               <a:rPr lang="en-CA" smtClean="0"/>
-              <a:t>15/03/2018</a:t>
+              <a:t>19/03/2018</a:t>
             </a:fld>
             <a:endParaRPr lang="en-CA"/>
           </a:p>
@@ -3359,8 +3361,8 @@
         </p:nvSpPr>
         <p:spPr>
           <a:xfrm>
-            <a:off x="381817" y="2413338"/>
-            <a:ext cx="8380366" cy="2031325"/>
+            <a:off x="381817" y="2690336"/>
+            <a:ext cx="8380366" cy="923330"/>
           </a:xfrm>
           <a:prstGeom prst="rect">
             <a:avLst/>
@@ -3375,15 +3377,22 @@
           <a:p>
             <a:pPr algn="ctr"/>
             <a:r>
-              <a:rPr lang="en-CA" dirty="0">
+              <a:rPr lang="en-CA" dirty="0" smtClean="0">
                 <a:solidFill>
                   <a:schemeClr val="bg1"/>
                 </a:solidFill>
                 <a:latin typeface="Arial" panose="020B0604020202020204" pitchFamily="34" charset="0"/>
                 <a:cs typeface="Arial" panose="020B0604020202020204" pitchFamily="34" charset="0"/>
               </a:rPr>
-              <a:t>On each trial you will be presented with a letter stimulus.  Your task is to indicate the letter you first see on the screen.</a:t>
-            </a:r>
+              <a:t>On the next set of trials, use up key to adjust the flicker.</a:t>
+            </a:r>
+            <a:endParaRPr lang="en-CA" dirty="0">
+              <a:solidFill>
+                <a:schemeClr val="bg1"/>
+              </a:solidFill>
+              <a:latin typeface="Arial" panose="020B0604020202020204" pitchFamily="34" charset="0"/>
+              <a:cs typeface="Arial" panose="020B0604020202020204" pitchFamily="34" charset="0"/>
+            </a:endParaRPr>
           </a:p>
           <a:p>
             <a:pPr algn="ctr"/>
@@ -3405,11 +3414,18 @@
                 <a:latin typeface="Arial" panose="020B0604020202020204" pitchFamily="34" charset="0"/>
                 <a:cs typeface="Arial" panose="020B0604020202020204" pitchFamily="34" charset="0"/>
               </a:rPr>
-              <a:t>Two response options will be shown immediately following the stimulus.  Press the left or right arrow key corresponding with your response.</a:t>
-            </a:r>
-          </a:p>
-          <a:p>
-            <a:pPr algn="ctr"/>
+              <a:t>Press the spacebar to </a:t>
+            </a:r>
+            <a:r>
+              <a:rPr lang="en-CA" dirty="0" smtClean="0">
+                <a:solidFill>
+                  <a:schemeClr val="bg1"/>
+                </a:solidFill>
+                <a:latin typeface="Arial" panose="020B0604020202020204" pitchFamily="34" charset="0"/>
+                <a:cs typeface="Arial" panose="020B0604020202020204" pitchFamily="34" charset="0"/>
+              </a:rPr>
+              <a:t>begin</a:t>
+            </a:r>
             <a:endParaRPr lang="en-CA" dirty="0">
               <a:solidFill>
                 <a:schemeClr val="bg1"/>
@@ -3418,25 +3434,12 @@
               <a:cs typeface="Arial" panose="020B0604020202020204" pitchFamily="34" charset="0"/>
             </a:endParaRPr>
           </a:p>
-          <a:p>
-            <a:pPr algn="ctr"/>
-            <a:r>
-              <a:rPr lang="en-CA" dirty="0">
-                <a:solidFill>
-                  <a:schemeClr val="bg1"/>
-                </a:solidFill>
-                <a:latin typeface="Arial" panose="020B0604020202020204" pitchFamily="34" charset="0"/>
-                <a:cs typeface="Arial" panose="020B0604020202020204" pitchFamily="34" charset="0"/>
-              </a:rPr>
-              <a:t>Press the spacebar to begin</a:t>
-            </a:r>
-          </a:p>
         </p:txBody>
       </p:sp>
     </p:spTree>
     <p:extLst>
       <p:ext uri="{BB962C8B-B14F-4D97-AF65-F5344CB8AC3E}">
-        <p14:creationId xmlns:p14="http://schemas.microsoft.com/office/powerpoint/2010/main" val="1799043823"/>
+        <p14:creationId xmlns:p14="http://schemas.microsoft.com/office/powerpoint/2010/main" val="2272325352"/>
       </p:ext>
     </p:extLst>
   </p:cSld>
@@ -3479,8 +3482,8 @@
         </p:nvSpPr>
         <p:spPr>
           <a:xfrm>
-            <a:off x="381817" y="2413338"/>
-            <a:ext cx="8380366" cy="2031325"/>
+            <a:off x="381817" y="2690336"/>
+            <a:ext cx="8380366" cy="923330"/>
           </a:xfrm>
           <a:prstGeom prst="rect">
             <a:avLst/>
@@ -3495,55 +3498,42 @@
           <a:p>
             <a:pPr algn="ctr"/>
             <a:r>
-              <a:rPr lang="en-CA" dirty="0">
+              <a:rPr lang="en-CA" dirty="0" smtClean="0">
                 <a:solidFill>
                   <a:schemeClr val="bg1"/>
                 </a:solidFill>
                 <a:latin typeface="Arial" panose="020B0604020202020204" pitchFamily="34" charset="0"/>
                 <a:cs typeface="Arial" panose="020B0604020202020204" pitchFamily="34" charset="0"/>
               </a:rPr>
-              <a:t>On each trial you will be presented with a letter stimulus.  Press the left arrow key if you see the letter </a:t>
-            </a:r>
-            <a:r>
-              <a:rPr lang="en-CA" dirty="0" smtClean="0">
+              <a:t>On the next set of trials, </a:t>
+            </a:r>
+            <a:r>
+              <a:rPr lang="en-CA" smtClean="0">
                 <a:solidFill>
                   <a:schemeClr val="bg1"/>
                 </a:solidFill>
                 <a:latin typeface="Arial" panose="020B0604020202020204" pitchFamily="34" charset="0"/>
                 <a:cs typeface="Arial" panose="020B0604020202020204" pitchFamily="34" charset="0"/>
               </a:rPr>
-              <a:t>‘H’ </a:t>
-            </a:r>
-            <a:r>
-              <a:rPr lang="en-CA" dirty="0">
+              <a:t>use down key </a:t>
+            </a:r>
+            <a:r>
+              <a:rPr lang="en-CA" dirty="0" smtClean="0">
                 <a:solidFill>
                   <a:schemeClr val="bg1"/>
                 </a:solidFill>
                 <a:latin typeface="Arial" panose="020B0604020202020204" pitchFamily="34" charset="0"/>
                 <a:cs typeface="Arial" panose="020B0604020202020204" pitchFamily="34" charset="0"/>
               </a:rPr>
-              <a:t>and the right arrow key if you do not see the letter </a:t>
-            </a:r>
-            <a:r>
-              <a:rPr lang="en-CA" dirty="0" smtClean="0">
-                <a:solidFill>
-                  <a:schemeClr val="bg1"/>
-                </a:solidFill>
-                <a:latin typeface="Arial" panose="020B0604020202020204" pitchFamily="34" charset="0"/>
-                <a:cs typeface="Arial" panose="020B0604020202020204" pitchFamily="34" charset="0"/>
-              </a:rPr>
-              <a:t>‘H’ </a:t>
-            </a:r>
-            <a:r>
-              <a:rPr lang="en-CA" dirty="0">
-                <a:solidFill>
-                  <a:schemeClr val="bg1"/>
-                </a:solidFill>
-                <a:latin typeface="Arial" panose="020B0604020202020204" pitchFamily="34" charset="0"/>
-                <a:cs typeface="Arial" panose="020B0604020202020204" pitchFamily="34" charset="0"/>
-              </a:rPr>
-              <a:t>displayed on each trial.  Please answer as quickly and accurately as possible.</a:t>
-            </a:r>
+              <a:t>to adjust the flicker.</a:t>
+            </a:r>
+            <a:endParaRPr lang="en-CA" dirty="0">
+              <a:solidFill>
+                <a:schemeClr val="bg1"/>
+              </a:solidFill>
+              <a:latin typeface="Arial" panose="020B0604020202020204" pitchFamily="34" charset="0"/>
+              <a:cs typeface="Arial" panose="020B0604020202020204" pitchFamily="34" charset="0"/>
+            </a:endParaRPr>
           </a:p>
           <a:p>
             <a:pPr algn="ctr"/>
@@ -3558,56 +3548,24 @@
           <a:p>
             <a:pPr algn="ctr"/>
             <a:r>
-              <a:rPr lang="en-CA" dirty="0" smtClean="0">
+              <a:rPr lang="en-CA" dirty="0">
                 <a:solidFill>
                   <a:schemeClr val="bg1"/>
                 </a:solidFill>
                 <a:latin typeface="Arial" panose="020B0604020202020204" pitchFamily="34" charset="0"/>
                 <a:cs typeface="Arial" panose="020B0604020202020204" pitchFamily="34" charset="0"/>
               </a:rPr>
-              <a:t>Not Present </a:t>
+              <a:t>Press the spacebar to </a:t>
             </a:r>
             <a:r>
               <a:rPr lang="en-CA" dirty="0" smtClean="0">
-                <a:solidFill>
-                  <a:schemeClr val="bg1"/>
-                </a:solidFill>
-                <a:latin typeface="Arial" panose="020B0604020202020204" pitchFamily="34" charset="0"/>
-                <a:cs typeface="Arial" panose="020B0604020202020204" pitchFamily="34" charset="0"/>
-                <a:sym typeface="Wingdings" panose="05000000000000000000" pitchFamily="2" charset="2"/>
-              </a:rPr>
-              <a:t></a:t>
-            </a:r>
-            <a:r>
-              <a:rPr lang="en-CA" dirty="0">
                 <a:solidFill>
                   <a:schemeClr val="bg1"/>
                 </a:solidFill>
                 <a:latin typeface="Arial" panose="020B0604020202020204" pitchFamily="34" charset="0"/>
                 <a:cs typeface="Arial" panose="020B0604020202020204" pitchFamily="34" charset="0"/>
               </a:rPr>
-              <a:t>		</a:t>
-            </a:r>
-            <a:r>
-              <a:rPr lang="en-CA" dirty="0" smtClean="0">
-                <a:solidFill>
-                  <a:schemeClr val="bg1"/>
-                </a:solidFill>
-                <a:latin typeface="Arial" panose="020B0604020202020204" pitchFamily="34" charset="0"/>
-                <a:cs typeface="Arial" panose="020B0604020202020204" pitchFamily="34" charset="0"/>
-                <a:sym typeface="Wingdings" panose="05000000000000000000" pitchFamily="2" charset="2"/>
-              </a:rPr>
-              <a:t></a:t>
-            </a:r>
-            <a:r>
-              <a:rPr lang="en-CA" dirty="0" smtClean="0">
-                <a:solidFill>
-                  <a:schemeClr val="bg1"/>
-                </a:solidFill>
-                <a:latin typeface="Arial" panose="020B0604020202020204" pitchFamily="34" charset="0"/>
-                <a:cs typeface="Arial" panose="020B0604020202020204" pitchFamily="34" charset="0"/>
-              </a:rPr>
-              <a:t> Present</a:t>
+              <a:t>begin</a:t>
             </a:r>
             <a:endParaRPr lang="en-CA" dirty="0">
               <a:solidFill>
@@ -3617,35 +3575,12 @@
               <a:cs typeface="Arial" panose="020B0604020202020204" pitchFamily="34" charset="0"/>
             </a:endParaRPr>
           </a:p>
-          <a:p>
-            <a:pPr algn="ctr"/>
-            <a:endParaRPr lang="en-CA" dirty="0">
-              <a:solidFill>
-                <a:schemeClr val="bg1"/>
-              </a:solidFill>
-              <a:latin typeface="Arial" panose="020B0604020202020204" pitchFamily="34" charset="0"/>
-              <a:cs typeface="Arial" panose="020B0604020202020204" pitchFamily="34" charset="0"/>
-            </a:endParaRPr>
-          </a:p>
-          <a:p>
-            <a:pPr algn="ctr"/>
-            <a:r>
-              <a:rPr lang="en-CA" dirty="0">
-                <a:solidFill>
-                  <a:schemeClr val="bg1"/>
-                </a:solidFill>
-                <a:latin typeface="Arial" panose="020B0604020202020204" pitchFamily="34" charset="0"/>
-                <a:cs typeface="Arial" panose="020B0604020202020204" pitchFamily="34" charset="0"/>
-              </a:rPr>
-              <a:t>Press the spacebar to begin</a:t>
-            </a:r>
-          </a:p>
         </p:txBody>
       </p:sp>
     </p:spTree>
     <p:extLst>
       <p:ext uri="{BB962C8B-B14F-4D97-AF65-F5344CB8AC3E}">
-        <p14:creationId xmlns:p14="http://schemas.microsoft.com/office/powerpoint/2010/main" val="1241897964"/>
+        <p14:creationId xmlns:p14="http://schemas.microsoft.com/office/powerpoint/2010/main" val="3323116710"/>
       </p:ext>
     </p:extLst>
   </p:cSld>
@@ -3688,6 +3623,335 @@
         </p:nvSpPr>
         <p:spPr>
           <a:xfrm>
+            <a:off x="381817" y="2413338"/>
+            <a:ext cx="8380366" cy="2031325"/>
+          </a:xfrm>
+          <a:prstGeom prst="rect">
+            <a:avLst/>
+          </a:prstGeom>
+          <a:noFill/>
+        </p:spPr>
+        <p:txBody>
+          <a:bodyPr wrap="square" rtlCol="0">
+            <a:spAutoFit/>
+          </a:bodyPr>
+          <a:lstStyle/>
+          <a:p>
+            <a:pPr algn="ctr"/>
+            <a:r>
+              <a:rPr lang="en-CA" dirty="0">
+                <a:solidFill>
+                  <a:schemeClr val="bg1"/>
+                </a:solidFill>
+                <a:latin typeface="Arial" panose="020B0604020202020204" pitchFamily="34" charset="0"/>
+                <a:cs typeface="Arial" panose="020B0604020202020204" pitchFamily="34" charset="0"/>
+              </a:rPr>
+              <a:t>On each trial you will be presented with a letter stimulus.  Your task is to indicate the letter you first see on the screen.</a:t>
+            </a:r>
+          </a:p>
+          <a:p>
+            <a:pPr algn="ctr"/>
+            <a:endParaRPr lang="en-CA" dirty="0">
+              <a:solidFill>
+                <a:schemeClr val="bg1"/>
+              </a:solidFill>
+              <a:latin typeface="Arial" panose="020B0604020202020204" pitchFamily="34" charset="0"/>
+              <a:cs typeface="Arial" panose="020B0604020202020204" pitchFamily="34" charset="0"/>
+            </a:endParaRPr>
+          </a:p>
+          <a:p>
+            <a:pPr algn="ctr"/>
+            <a:r>
+              <a:rPr lang="en-CA" dirty="0">
+                <a:solidFill>
+                  <a:schemeClr val="bg1"/>
+                </a:solidFill>
+                <a:latin typeface="Arial" panose="020B0604020202020204" pitchFamily="34" charset="0"/>
+                <a:cs typeface="Arial" panose="020B0604020202020204" pitchFamily="34" charset="0"/>
+              </a:rPr>
+              <a:t>Two response options will be shown immediately following the stimulus.  Press the left or right arrow key corresponding with your response.</a:t>
+            </a:r>
+          </a:p>
+          <a:p>
+            <a:pPr algn="ctr"/>
+            <a:endParaRPr lang="en-CA" dirty="0">
+              <a:solidFill>
+                <a:schemeClr val="bg1"/>
+              </a:solidFill>
+              <a:latin typeface="Arial" panose="020B0604020202020204" pitchFamily="34" charset="0"/>
+              <a:cs typeface="Arial" panose="020B0604020202020204" pitchFamily="34" charset="0"/>
+            </a:endParaRPr>
+          </a:p>
+          <a:p>
+            <a:pPr algn="ctr"/>
+            <a:r>
+              <a:rPr lang="en-CA" dirty="0">
+                <a:solidFill>
+                  <a:schemeClr val="bg1"/>
+                </a:solidFill>
+                <a:latin typeface="Arial" panose="020B0604020202020204" pitchFamily="34" charset="0"/>
+                <a:cs typeface="Arial" panose="020B0604020202020204" pitchFamily="34" charset="0"/>
+              </a:rPr>
+              <a:t>Press the spacebar to begin</a:t>
+            </a:r>
+          </a:p>
+        </p:txBody>
+      </p:sp>
+    </p:spTree>
+    <p:extLst>
+      <p:ext uri="{BB962C8B-B14F-4D97-AF65-F5344CB8AC3E}">
+        <p14:creationId xmlns:p14="http://schemas.microsoft.com/office/powerpoint/2010/main" val="1799043823"/>
+      </p:ext>
+    </p:extLst>
+  </p:cSld>
+  <p:clrMapOvr>
+    <a:masterClrMapping/>
+  </p:clrMapOvr>
+</p:sld>
+</file>
+
+<file path=ppt/slides/slide7.xml><?xml version="1.0" encoding="utf-8"?>
+<p:sld xmlns:a="http://schemas.openxmlformats.org/drawingml/2006/main" xmlns:r="http://schemas.openxmlformats.org/officeDocument/2006/relationships" xmlns:p="http://schemas.openxmlformats.org/presentationml/2006/main">
+  <p:cSld>
+    <p:bg>
+      <p:bgPr>
+        <a:solidFill>
+          <a:srgbClr val="808080"/>
+        </a:solidFill>
+        <a:effectLst/>
+      </p:bgPr>
+    </p:bg>
+    <p:spTree>
+      <p:nvGrpSpPr>
+        <p:cNvPr id="1" name=""/>
+        <p:cNvGrpSpPr/>
+        <p:nvPr/>
+      </p:nvGrpSpPr>
+      <p:grpSpPr>
+        <a:xfrm>
+          <a:off x="0" y="0"/>
+          <a:ext cx="0" cy="0"/>
+          <a:chOff x="0" y="0"/>
+          <a:chExt cx="0" cy="0"/>
+        </a:xfrm>
+      </p:grpSpPr>
+      <p:sp>
+        <p:nvSpPr>
+          <p:cNvPr id="4" name="TextBox 3"/>
+          <p:cNvSpPr txBox="1"/>
+          <p:nvPr/>
+        </p:nvSpPr>
+        <p:spPr>
+          <a:xfrm>
+            <a:off x="381817" y="2413338"/>
+            <a:ext cx="8380366" cy="2031325"/>
+          </a:xfrm>
+          <a:prstGeom prst="rect">
+            <a:avLst/>
+          </a:prstGeom>
+          <a:noFill/>
+        </p:spPr>
+        <p:txBody>
+          <a:bodyPr wrap="square" rtlCol="0">
+            <a:spAutoFit/>
+          </a:bodyPr>
+          <a:lstStyle/>
+          <a:p>
+            <a:pPr algn="ctr"/>
+            <a:r>
+              <a:rPr lang="en-CA" dirty="0">
+                <a:solidFill>
+                  <a:schemeClr val="bg1"/>
+                </a:solidFill>
+                <a:latin typeface="Arial" panose="020B0604020202020204" pitchFamily="34" charset="0"/>
+                <a:cs typeface="Arial" panose="020B0604020202020204" pitchFamily="34" charset="0"/>
+              </a:rPr>
+              <a:t>On each trial you will be presented with a letter stimulus.  Press the left arrow key if you see the letter </a:t>
+            </a:r>
+            <a:r>
+              <a:rPr lang="en-CA" dirty="0" smtClean="0">
+                <a:solidFill>
+                  <a:schemeClr val="bg1"/>
+                </a:solidFill>
+                <a:latin typeface="Arial" panose="020B0604020202020204" pitchFamily="34" charset="0"/>
+                <a:cs typeface="Arial" panose="020B0604020202020204" pitchFamily="34" charset="0"/>
+              </a:rPr>
+              <a:t>‘H’ </a:t>
+            </a:r>
+            <a:r>
+              <a:rPr lang="en-CA" dirty="0">
+                <a:solidFill>
+                  <a:schemeClr val="bg1"/>
+                </a:solidFill>
+                <a:latin typeface="Arial" panose="020B0604020202020204" pitchFamily="34" charset="0"/>
+                <a:cs typeface="Arial" panose="020B0604020202020204" pitchFamily="34" charset="0"/>
+              </a:rPr>
+              <a:t>and the right arrow key if you do not see the letter </a:t>
+            </a:r>
+            <a:r>
+              <a:rPr lang="en-CA" dirty="0" smtClean="0">
+                <a:solidFill>
+                  <a:schemeClr val="bg1"/>
+                </a:solidFill>
+                <a:latin typeface="Arial" panose="020B0604020202020204" pitchFamily="34" charset="0"/>
+                <a:cs typeface="Arial" panose="020B0604020202020204" pitchFamily="34" charset="0"/>
+              </a:rPr>
+              <a:t>‘H’ </a:t>
+            </a:r>
+            <a:r>
+              <a:rPr lang="en-CA" dirty="0">
+                <a:solidFill>
+                  <a:schemeClr val="bg1"/>
+                </a:solidFill>
+                <a:latin typeface="Arial" panose="020B0604020202020204" pitchFamily="34" charset="0"/>
+                <a:cs typeface="Arial" panose="020B0604020202020204" pitchFamily="34" charset="0"/>
+              </a:rPr>
+              <a:t>displayed on each trial.  Please answer as quickly and accurately as possible.</a:t>
+            </a:r>
+          </a:p>
+          <a:p>
+            <a:pPr algn="ctr"/>
+            <a:endParaRPr lang="en-CA" dirty="0">
+              <a:solidFill>
+                <a:schemeClr val="bg1"/>
+              </a:solidFill>
+              <a:latin typeface="Arial" panose="020B0604020202020204" pitchFamily="34" charset="0"/>
+              <a:cs typeface="Arial" panose="020B0604020202020204" pitchFamily="34" charset="0"/>
+            </a:endParaRPr>
+          </a:p>
+          <a:p>
+            <a:pPr algn="ctr"/>
+            <a:r>
+              <a:rPr lang="en-CA" dirty="0" smtClean="0">
+                <a:solidFill>
+                  <a:schemeClr val="bg1"/>
+                </a:solidFill>
+                <a:latin typeface="Arial" panose="020B0604020202020204" pitchFamily="34" charset="0"/>
+                <a:cs typeface="Arial" panose="020B0604020202020204" pitchFamily="34" charset="0"/>
+              </a:rPr>
+              <a:t>Not Present </a:t>
+            </a:r>
+            <a:r>
+              <a:rPr lang="en-CA" dirty="0" smtClean="0">
+                <a:solidFill>
+                  <a:schemeClr val="bg1"/>
+                </a:solidFill>
+                <a:latin typeface="Arial" panose="020B0604020202020204" pitchFamily="34" charset="0"/>
+                <a:cs typeface="Arial" panose="020B0604020202020204" pitchFamily="34" charset="0"/>
+                <a:sym typeface="Wingdings" panose="05000000000000000000" pitchFamily="2" charset="2"/>
+              </a:rPr>
+              <a:t></a:t>
+            </a:r>
+            <a:r>
+              <a:rPr lang="en-CA" dirty="0">
+                <a:solidFill>
+                  <a:schemeClr val="bg1"/>
+                </a:solidFill>
+                <a:latin typeface="Arial" panose="020B0604020202020204" pitchFamily="34" charset="0"/>
+                <a:cs typeface="Arial" panose="020B0604020202020204" pitchFamily="34" charset="0"/>
+              </a:rPr>
+              <a:t>		</a:t>
+            </a:r>
+            <a:r>
+              <a:rPr lang="en-CA" dirty="0" smtClean="0">
+                <a:solidFill>
+                  <a:schemeClr val="bg1"/>
+                </a:solidFill>
+                <a:latin typeface="Arial" panose="020B0604020202020204" pitchFamily="34" charset="0"/>
+                <a:cs typeface="Arial" panose="020B0604020202020204" pitchFamily="34" charset="0"/>
+                <a:sym typeface="Wingdings" panose="05000000000000000000" pitchFamily="2" charset="2"/>
+              </a:rPr>
+              <a:t></a:t>
+            </a:r>
+            <a:r>
+              <a:rPr lang="en-CA" dirty="0" smtClean="0">
+                <a:solidFill>
+                  <a:schemeClr val="bg1"/>
+                </a:solidFill>
+                <a:latin typeface="Arial" panose="020B0604020202020204" pitchFamily="34" charset="0"/>
+                <a:cs typeface="Arial" panose="020B0604020202020204" pitchFamily="34" charset="0"/>
+              </a:rPr>
+              <a:t> Present</a:t>
+            </a:r>
+            <a:endParaRPr lang="en-CA" dirty="0">
+              <a:solidFill>
+                <a:schemeClr val="bg1"/>
+              </a:solidFill>
+              <a:latin typeface="Arial" panose="020B0604020202020204" pitchFamily="34" charset="0"/>
+              <a:cs typeface="Arial" panose="020B0604020202020204" pitchFamily="34" charset="0"/>
+            </a:endParaRPr>
+          </a:p>
+          <a:p>
+            <a:pPr algn="ctr"/>
+            <a:endParaRPr lang="en-CA" dirty="0">
+              <a:solidFill>
+                <a:schemeClr val="bg1"/>
+              </a:solidFill>
+              <a:latin typeface="Arial" panose="020B0604020202020204" pitchFamily="34" charset="0"/>
+              <a:cs typeface="Arial" panose="020B0604020202020204" pitchFamily="34" charset="0"/>
+            </a:endParaRPr>
+          </a:p>
+          <a:p>
+            <a:pPr algn="ctr"/>
+            <a:r>
+              <a:rPr lang="en-CA" dirty="0">
+                <a:solidFill>
+                  <a:schemeClr val="bg1"/>
+                </a:solidFill>
+                <a:latin typeface="Arial" panose="020B0604020202020204" pitchFamily="34" charset="0"/>
+                <a:cs typeface="Arial" panose="020B0604020202020204" pitchFamily="34" charset="0"/>
+              </a:rPr>
+              <a:t>Press the spacebar to begin</a:t>
+            </a:r>
+          </a:p>
+        </p:txBody>
+      </p:sp>
+    </p:spTree>
+    <p:extLst>
+      <p:ext uri="{BB962C8B-B14F-4D97-AF65-F5344CB8AC3E}">
+        <p14:creationId xmlns:p14="http://schemas.microsoft.com/office/powerpoint/2010/main" val="1241897964"/>
+      </p:ext>
+    </p:extLst>
+  </p:cSld>
+  <p:clrMapOvr>
+    <a:masterClrMapping/>
+  </p:clrMapOvr>
+</p:sld>
+</file>
+
+<file path=ppt/slides/slide8.xml><?xml version="1.0" encoding="utf-8"?>
+<p:sld xmlns:a="http://schemas.openxmlformats.org/drawingml/2006/main" xmlns:r="http://schemas.openxmlformats.org/officeDocument/2006/relationships" xmlns:p="http://schemas.openxmlformats.org/presentationml/2006/main">
+  <p:cSld>
+    <p:bg>
+      <p:bgPr>
+        <a:solidFill>
+          <a:srgbClr val="808080"/>
+        </a:solidFill>
+        <a:effectLst/>
+      </p:bgPr>
+    </p:bg>
+    <p:spTree>
+      <p:nvGrpSpPr>
+        <p:cNvPr id="1" name=""/>
+        <p:cNvGrpSpPr/>
+        <p:nvPr/>
+      </p:nvGrpSpPr>
+      <p:grpSpPr>
+        <a:xfrm>
+          <a:off x="0" y="0"/>
+          <a:ext cx="0" cy="0"/>
+          <a:chOff x="0" y="0"/>
+          <a:chExt cx="0" cy="0"/>
+        </a:xfrm>
+      </p:grpSpPr>
+      <p:sp>
+        <p:nvSpPr>
+          <p:cNvPr id="4" name="TextBox 3"/>
+          <p:cNvSpPr txBox="1"/>
+          <p:nvPr/>
+        </p:nvSpPr>
+        <p:spPr>
+          <a:xfrm>
             <a:off x="381817" y="2274838"/>
             <a:ext cx="8380366" cy="1754326"/>
           </a:xfrm>
@@ -3772,7 +4036,7 @@
 </p:sld>
 </file>
 
-<file path=ppt/slides/slide7.xml><?xml version="1.0" encoding="utf-8"?>
+<file path=ppt/slides/slide9.xml><?xml version="1.0" encoding="utf-8"?>
 <p:sld xmlns:a="http://schemas.openxmlformats.org/drawingml/2006/main" xmlns:r="http://schemas.openxmlformats.org/officeDocument/2006/relationships" xmlns:p="http://schemas.openxmlformats.org/presentationml/2006/main">
   <p:cSld>
     <p:bg>

</xml_diff>

<commit_message>
fixed bug with instrucitons
</commit_message>
<xml_diff>
--- a/images/instructions/instructions.pptx
+++ b/images/instructions/instructions.pptx
@@ -4,6 +4,9 @@
   <p:sldMasterIdLst>
     <p:sldMasterId id="2147483660" r:id="rId1"/>
   </p:sldMasterIdLst>
+  <p:notesMasterIdLst>
+    <p:notesMasterId r:id="rId13"/>
+  </p:notesMasterIdLst>
   <p:sldIdLst>
     <p:sldId id="256" r:id="rId2"/>
     <p:sldId id="262" r:id="rId3"/>
@@ -12,8 +15,10 @@
     <p:sldId id="264" r:id="rId6"/>
     <p:sldId id="258" r:id="rId7"/>
     <p:sldId id="259" r:id="rId8"/>
-    <p:sldId id="260" r:id="rId9"/>
-    <p:sldId id="261" r:id="rId10"/>
+    <p:sldId id="265" r:id="rId9"/>
+    <p:sldId id="266" r:id="rId10"/>
+    <p:sldId id="260" r:id="rId11"/>
+    <p:sldId id="261" r:id="rId12"/>
   </p:sldIdLst>
   <p:sldSz cx="9144000" cy="6858000" type="screen4x3"/>
   <p:notesSz cx="6858000" cy="9144000"/>
@@ -114,10 +119,371 @@
   </p:defaultTextStyle>
   <p:extLst>
     <p:ext uri="{EFAFB233-063F-42B5-8137-9DF3F51BA10A}">
-      <p15:sldGuideLst xmlns:p15="http://schemas.microsoft.com/office/powerpoint/2012/main"/>
+      <p15:sldGuideLst xmlns:p15="http://schemas.microsoft.com/office/powerpoint/2012/main">
+        <p15:guide id="1" orient="horz" pos="2160" userDrawn="1">
+          <p15:clr>
+            <a:srgbClr val="A4A3A4"/>
+          </p15:clr>
+        </p15:guide>
+        <p15:guide id="2" pos="2880" userDrawn="1">
+          <p15:clr>
+            <a:srgbClr val="A4A3A4"/>
+          </p15:clr>
+        </p15:guide>
+      </p15:sldGuideLst>
     </p:ext>
   </p:extLst>
 </p:presentation>
+</file>
+
+<file path=ppt/notesMasters/notesMaster1.xml><?xml version="1.0" encoding="utf-8"?>
+<p:notesMaster xmlns:a="http://schemas.openxmlformats.org/drawingml/2006/main" xmlns:r="http://schemas.openxmlformats.org/officeDocument/2006/relationships" xmlns:p="http://schemas.openxmlformats.org/presentationml/2006/main">
+  <p:cSld>
+    <p:bg>
+      <p:bgRef idx="1001">
+        <a:schemeClr val="bg1"/>
+      </p:bgRef>
+    </p:bg>
+    <p:spTree>
+      <p:nvGrpSpPr>
+        <p:cNvPr id="1" name=""/>
+        <p:cNvGrpSpPr/>
+        <p:nvPr/>
+      </p:nvGrpSpPr>
+      <p:grpSpPr>
+        <a:xfrm>
+          <a:off x="0" y="0"/>
+          <a:ext cx="0" cy="0"/>
+          <a:chOff x="0" y="0"/>
+          <a:chExt cx="0" cy="0"/>
+        </a:xfrm>
+      </p:grpSpPr>
+      <p:sp>
+        <p:nvSpPr>
+          <p:cNvPr id="2" name="Header Placeholder 1"/>
+          <p:cNvSpPr>
+            <a:spLocks noGrp="1"/>
+          </p:cNvSpPr>
+          <p:nvPr>
+            <p:ph type="hdr" sz="quarter"/>
+          </p:nvPr>
+        </p:nvSpPr>
+        <p:spPr>
+          <a:xfrm>
+            <a:off x="0" y="0"/>
+            <a:ext cx="2971800" cy="458788"/>
+          </a:xfrm>
+          <a:prstGeom prst="rect">
+            <a:avLst/>
+          </a:prstGeom>
+        </p:spPr>
+        <p:txBody>
+          <a:bodyPr vert="horz" lIns="91440" tIns="45720" rIns="91440" bIns="45720" rtlCol="0"/>
+          <a:lstStyle>
+            <a:lvl1pPr algn="l">
+              <a:defRPr sz="1200"/>
+            </a:lvl1pPr>
+          </a:lstStyle>
+          <a:p>
+            <a:endParaRPr lang="en-CA"/>
+          </a:p>
+        </p:txBody>
+      </p:sp>
+      <p:sp>
+        <p:nvSpPr>
+          <p:cNvPr id="3" name="Date Placeholder 2"/>
+          <p:cNvSpPr>
+            <a:spLocks noGrp="1"/>
+          </p:cNvSpPr>
+          <p:nvPr>
+            <p:ph type="dt" idx="1"/>
+          </p:nvPr>
+        </p:nvSpPr>
+        <p:spPr>
+          <a:xfrm>
+            <a:off x="3884613" y="0"/>
+            <a:ext cx="2971800" cy="458788"/>
+          </a:xfrm>
+          <a:prstGeom prst="rect">
+            <a:avLst/>
+          </a:prstGeom>
+        </p:spPr>
+        <p:txBody>
+          <a:bodyPr vert="horz" lIns="91440" tIns="45720" rIns="91440" bIns="45720" rtlCol="0"/>
+          <a:lstStyle>
+            <a:lvl1pPr algn="r">
+              <a:defRPr sz="1200"/>
+            </a:lvl1pPr>
+          </a:lstStyle>
+          <a:p>
+            <a:fld id="{BACB0B72-BBCE-4794-A7EC-CF45B082918D}" type="datetimeFigureOut">
+              <a:rPr lang="en-CA" smtClean="0"/>
+              <a:t>21/03/2018</a:t>
+            </a:fld>
+            <a:endParaRPr lang="en-CA"/>
+          </a:p>
+        </p:txBody>
+      </p:sp>
+      <p:sp>
+        <p:nvSpPr>
+          <p:cNvPr id="4" name="Slide Image Placeholder 3"/>
+          <p:cNvSpPr>
+            <a:spLocks noGrp="1" noRot="1" noChangeAspect="1"/>
+          </p:cNvSpPr>
+          <p:nvPr>
+            <p:ph type="sldImg" idx="2"/>
+          </p:nvPr>
+        </p:nvSpPr>
+        <p:spPr>
+          <a:xfrm>
+            <a:off x="1371600" y="1143000"/>
+            <a:ext cx="4114800" cy="3086100"/>
+          </a:xfrm>
+          <a:prstGeom prst="rect">
+            <a:avLst/>
+          </a:prstGeom>
+          <a:noFill/>
+          <a:ln w="12700">
+            <a:solidFill>
+              <a:prstClr val="black"/>
+            </a:solidFill>
+          </a:ln>
+        </p:spPr>
+        <p:txBody>
+          <a:bodyPr vert="horz" lIns="91440" tIns="45720" rIns="91440" bIns="45720" rtlCol="0" anchor="ctr"/>
+          <a:lstStyle/>
+          <a:p>
+            <a:endParaRPr lang="en-CA"/>
+          </a:p>
+        </p:txBody>
+      </p:sp>
+      <p:sp>
+        <p:nvSpPr>
+          <p:cNvPr id="5" name="Notes Placeholder 4"/>
+          <p:cNvSpPr>
+            <a:spLocks noGrp="1"/>
+          </p:cNvSpPr>
+          <p:nvPr>
+            <p:ph type="body" sz="quarter" idx="3"/>
+          </p:nvPr>
+        </p:nvSpPr>
+        <p:spPr>
+          <a:xfrm>
+            <a:off x="685800" y="4400550"/>
+            <a:ext cx="5486400" cy="3600450"/>
+          </a:xfrm>
+          <a:prstGeom prst="rect">
+            <a:avLst/>
+          </a:prstGeom>
+        </p:spPr>
+        <p:txBody>
+          <a:bodyPr vert="horz" lIns="91440" tIns="45720" rIns="91440" bIns="45720" rtlCol="0"/>
+          <a:lstStyle/>
+          <a:p>
+            <a:pPr lvl="0"/>
+            <a:r>
+              <a:rPr lang="en-US" smtClean="0"/>
+              <a:t>Edit Master text styles</a:t>
+            </a:r>
+          </a:p>
+          <a:p>
+            <a:pPr lvl="1"/>
+            <a:r>
+              <a:rPr lang="en-US" smtClean="0"/>
+              <a:t>Second level</a:t>
+            </a:r>
+          </a:p>
+          <a:p>
+            <a:pPr lvl="2"/>
+            <a:r>
+              <a:rPr lang="en-US" smtClean="0"/>
+              <a:t>Third level</a:t>
+            </a:r>
+          </a:p>
+          <a:p>
+            <a:pPr lvl="3"/>
+            <a:r>
+              <a:rPr lang="en-US" smtClean="0"/>
+              <a:t>Fourth level</a:t>
+            </a:r>
+          </a:p>
+          <a:p>
+            <a:pPr lvl="4"/>
+            <a:r>
+              <a:rPr lang="en-US" smtClean="0"/>
+              <a:t>Fifth level</a:t>
+            </a:r>
+            <a:endParaRPr lang="en-CA"/>
+          </a:p>
+        </p:txBody>
+      </p:sp>
+      <p:sp>
+        <p:nvSpPr>
+          <p:cNvPr id="6" name="Footer Placeholder 5"/>
+          <p:cNvSpPr>
+            <a:spLocks noGrp="1"/>
+          </p:cNvSpPr>
+          <p:nvPr>
+            <p:ph type="ftr" sz="quarter" idx="4"/>
+          </p:nvPr>
+        </p:nvSpPr>
+        <p:spPr>
+          <a:xfrm>
+            <a:off x="0" y="8685213"/>
+            <a:ext cx="2971800" cy="458787"/>
+          </a:xfrm>
+          <a:prstGeom prst="rect">
+            <a:avLst/>
+          </a:prstGeom>
+        </p:spPr>
+        <p:txBody>
+          <a:bodyPr vert="horz" lIns="91440" tIns="45720" rIns="91440" bIns="45720" rtlCol="0" anchor="b"/>
+          <a:lstStyle>
+            <a:lvl1pPr algn="l">
+              <a:defRPr sz="1200"/>
+            </a:lvl1pPr>
+          </a:lstStyle>
+          <a:p>
+            <a:endParaRPr lang="en-CA"/>
+          </a:p>
+        </p:txBody>
+      </p:sp>
+      <p:sp>
+        <p:nvSpPr>
+          <p:cNvPr id="7" name="Slide Number Placeholder 6"/>
+          <p:cNvSpPr>
+            <a:spLocks noGrp="1"/>
+          </p:cNvSpPr>
+          <p:nvPr>
+            <p:ph type="sldNum" sz="quarter" idx="5"/>
+          </p:nvPr>
+        </p:nvSpPr>
+        <p:spPr>
+          <a:xfrm>
+            <a:off x="3884613" y="8685213"/>
+            <a:ext cx="2971800" cy="458787"/>
+          </a:xfrm>
+          <a:prstGeom prst="rect">
+            <a:avLst/>
+          </a:prstGeom>
+        </p:spPr>
+        <p:txBody>
+          <a:bodyPr vert="horz" lIns="91440" tIns="45720" rIns="91440" bIns="45720" rtlCol="0" anchor="b"/>
+          <a:lstStyle>
+            <a:lvl1pPr algn="r">
+              <a:defRPr sz="1200"/>
+            </a:lvl1pPr>
+          </a:lstStyle>
+          <a:p>
+            <a:fld id="{0620FF28-24B5-496E-AA6A-D0B8D675E101}" type="slidenum">
+              <a:rPr lang="en-CA" smtClean="0"/>
+              <a:t>‹#›</a:t>
+            </a:fld>
+            <a:endParaRPr lang="en-CA"/>
+          </a:p>
+        </p:txBody>
+      </p:sp>
+    </p:spTree>
+    <p:extLst>
+      <p:ext uri="{BB962C8B-B14F-4D97-AF65-F5344CB8AC3E}">
+        <p14:creationId xmlns:p14="http://schemas.microsoft.com/office/powerpoint/2010/main" val="360029056"/>
+      </p:ext>
+    </p:extLst>
+  </p:cSld>
+  <p:clrMap bg1="lt1" tx1="dk1" bg2="lt2" tx2="dk2" accent1="accent1" accent2="accent2" accent3="accent3" accent4="accent4" accent5="accent5" accent6="accent6" hlink="hlink" folHlink="folHlink"/>
+  <p:notesStyle>
+    <a:lvl1pPr marL="0" algn="l" defTabSz="914400" rtl="0" eaLnBrk="1" latinLnBrk="0" hangingPunct="1">
+      <a:defRPr sz="1200" kern="1200">
+        <a:solidFill>
+          <a:schemeClr val="tx1"/>
+        </a:solidFill>
+        <a:latin typeface="+mn-lt"/>
+        <a:ea typeface="+mn-ea"/>
+        <a:cs typeface="+mn-cs"/>
+      </a:defRPr>
+    </a:lvl1pPr>
+    <a:lvl2pPr marL="457200" algn="l" defTabSz="914400" rtl="0" eaLnBrk="1" latinLnBrk="0" hangingPunct="1">
+      <a:defRPr sz="1200" kern="1200">
+        <a:solidFill>
+          <a:schemeClr val="tx1"/>
+        </a:solidFill>
+        <a:latin typeface="+mn-lt"/>
+        <a:ea typeface="+mn-ea"/>
+        <a:cs typeface="+mn-cs"/>
+      </a:defRPr>
+    </a:lvl2pPr>
+    <a:lvl3pPr marL="914400" algn="l" defTabSz="914400" rtl="0" eaLnBrk="1" latinLnBrk="0" hangingPunct="1">
+      <a:defRPr sz="1200" kern="1200">
+        <a:solidFill>
+          <a:schemeClr val="tx1"/>
+        </a:solidFill>
+        <a:latin typeface="+mn-lt"/>
+        <a:ea typeface="+mn-ea"/>
+        <a:cs typeface="+mn-cs"/>
+      </a:defRPr>
+    </a:lvl3pPr>
+    <a:lvl4pPr marL="1371600" algn="l" defTabSz="914400" rtl="0" eaLnBrk="1" latinLnBrk="0" hangingPunct="1">
+      <a:defRPr sz="1200" kern="1200">
+        <a:solidFill>
+          <a:schemeClr val="tx1"/>
+        </a:solidFill>
+        <a:latin typeface="+mn-lt"/>
+        <a:ea typeface="+mn-ea"/>
+        <a:cs typeface="+mn-cs"/>
+      </a:defRPr>
+    </a:lvl4pPr>
+    <a:lvl5pPr marL="1828800" algn="l" defTabSz="914400" rtl="0" eaLnBrk="1" latinLnBrk="0" hangingPunct="1">
+      <a:defRPr sz="1200" kern="1200">
+        <a:solidFill>
+          <a:schemeClr val="tx1"/>
+        </a:solidFill>
+        <a:latin typeface="+mn-lt"/>
+        <a:ea typeface="+mn-ea"/>
+        <a:cs typeface="+mn-cs"/>
+      </a:defRPr>
+    </a:lvl5pPr>
+    <a:lvl6pPr marL="2286000" algn="l" defTabSz="914400" rtl="0" eaLnBrk="1" latinLnBrk="0" hangingPunct="1">
+      <a:defRPr sz="1200" kern="1200">
+        <a:solidFill>
+          <a:schemeClr val="tx1"/>
+        </a:solidFill>
+        <a:latin typeface="+mn-lt"/>
+        <a:ea typeface="+mn-ea"/>
+        <a:cs typeface="+mn-cs"/>
+      </a:defRPr>
+    </a:lvl6pPr>
+    <a:lvl7pPr marL="2743200" algn="l" defTabSz="914400" rtl="0" eaLnBrk="1" latinLnBrk="0" hangingPunct="1">
+      <a:defRPr sz="1200" kern="1200">
+        <a:solidFill>
+          <a:schemeClr val="tx1"/>
+        </a:solidFill>
+        <a:latin typeface="+mn-lt"/>
+        <a:ea typeface="+mn-ea"/>
+        <a:cs typeface="+mn-cs"/>
+      </a:defRPr>
+    </a:lvl7pPr>
+    <a:lvl8pPr marL="3200400" algn="l" defTabSz="914400" rtl="0" eaLnBrk="1" latinLnBrk="0" hangingPunct="1">
+      <a:defRPr sz="1200" kern="1200">
+        <a:solidFill>
+          <a:schemeClr val="tx1"/>
+        </a:solidFill>
+        <a:latin typeface="+mn-lt"/>
+        <a:ea typeface="+mn-ea"/>
+        <a:cs typeface="+mn-cs"/>
+      </a:defRPr>
+    </a:lvl8pPr>
+    <a:lvl9pPr marL="3657600" algn="l" defTabSz="914400" rtl="0" eaLnBrk="1" latinLnBrk="0" hangingPunct="1">
+      <a:defRPr sz="1200" kern="1200">
+        <a:solidFill>
+          <a:schemeClr val="tx1"/>
+        </a:solidFill>
+        <a:latin typeface="+mn-lt"/>
+        <a:ea typeface="+mn-ea"/>
+        <a:cs typeface="+mn-cs"/>
+      </a:defRPr>
+    </a:lvl9pPr>
+  </p:notesStyle>
+</p:notesMaster>
 </file>
 
 <file path=ppt/slideLayouts/slideLayout1.xml><?xml version="1.0" encoding="utf-8"?>
@@ -251,7 +617,7 @@
           <a:p>
             <a:fld id="{E4A4F39D-5229-437F-8485-17CB22BA73AE}" type="datetimeFigureOut">
               <a:rPr lang="en-CA" smtClean="0"/>
-              <a:t>19/03/2018</a:t>
+              <a:t>21/03/2018</a:t>
             </a:fld>
             <a:endParaRPr lang="en-CA"/>
           </a:p>
@@ -421,7 +787,7 @@
           <a:p>
             <a:fld id="{E4A4F39D-5229-437F-8485-17CB22BA73AE}" type="datetimeFigureOut">
               <a:rPr lang="en-CA" smtClean="0"/>
-              <a:t>19/03/2018</a:t>
+              <a:t>21/03/2018</a:t>
             </a:fld>
             <a:endParaRPr lang="en-CA"/>
           </a:p>
@@ -601,7 +967,7 @@
           <a:p>
             <a:fld id="{E4A4F39D-5229-437F-8485-17CB22BA73AE}" type="datetimeFigureOut">
               <a:rPr lang="en-CA" smtClean="0"/>
-              <a:t>19/03/2018</a:t>
+              <a:t>21/03/2018</a:t>
             </a:fld>
             <a:endParaRPr lang="en-CA"/>
           </a:p>
@@ -771,7 +1137,7 @@
           <a:p>
             <a:fld id="{E4A4F39D-5229-437F-8485-17CB22BA73AE}" type="datetimeFigureOut">
               <a:rPr lang="en-CA" smtClean="0"/>
-              <a:t>19/03/2018</a:t>
+              <a:t>21/03/2018</a:t>
             </a:fld>
             <a:endParaRPr lang="en-CA"/>
           </a:p>
@@ -1015,7 +1381,7 @@
           <a:p>
             <a:fld id="{E4A4F39D-5229-437F-8485-17CB22BA73AE}" type="datetimeFigureOut">
               <a:rPr lang="en-CA" smtClean="0"/>
-              <a:t>19/03/2018</a:t>
+              <a:t>21/03/2018</a:t>
             </a:fld>
             <a:endParaRPr lang="en-CA"/>
           </a:p>
@@ -1247,7 +1613,7 @@
           <a:p>
             <a:fld id="{E4A4F39D-5229-437F-8485-17CB22BA73AE}" type="datetimeFigureOut">
               <a:rPr lang="en-CA" smtClean="0"/>
-              <a:t>19/03/2018</a:t>
+              <a:t>21/03/2018</a:t>
             </a:fld>
             <a:endParaRPr lang="en-CA"/>
           </a:p>
@@ -1614,7 +1980,7 @@
           <a:p>
             <a:fld id="{E4A4F39D-5229-437F-8485-17CB22BA73AE}" type="datetimeFigureOut">
               <a:rPr lang="en-CA" smtClean="0"/>
-              <a:t>19/03/2018</a:t>
+              <a:t>21/03/2018</a:t>
             </a:fld>
             <a:endParaRPr lang="en-CA"/>
           </a:p>
@@ -1732,7 +2098,7 @@
           <a:p>
             <a:fld id="{E4A4F39D-5229-437F-8485-17CB22BA73AE}" type="datetimeFigureOut">
               <a:rPr lang="en-CA" smtClean="0"/>
-              <a:t>19/03/2018</a:t>
+              <a:t>21/03/2018</a:t>
             </a:fld>
             <a:endParaRPr lang="en-CA"/>
           </a:p>
@@ -1827,7 +2193,7 @@
           <a:p>
             <a:fld id="{E4A4F39D-5229-437F-8485-17CB22BA73AE}" type="datetimeFigureOut">
               <a:rPr lang="en-CA" smtClean="0"/>
-              <a:t>19/03/2018</a:t>
+              <a:t>21/03/2018</a:t>
             </a:fld>
             <a:endParaRPr lang="en-CA"/>
           </a:p>
@@ -2104,7 +2470,7 @@
           <a:p>
             <a:fld id="{E4A4F39D-5229-437F-8485-17CB22BA73AE}" type="datetimeFigureOut">
               <a:rPr lang="en-CA" smtClean="0"/>
-              <a:t>19/03/2018</a:t>
+              <a:t>21/03/2018</a:t>
             </a:fld>
             <a:endParaRPr lang="en-CA"/>
           </a:p>
@@ -2361,7 +2727,7 @@
           <a:p>
             <a:fld id="{E4A4F39D-5229-437F-8485-17CB22BA73AE}" type="datetimeFigureOut">
               <a:rPr lang="en-CA" smtClean="0"/>
-              <a:t>19/03/2018</a:t>
+              <a:t>21/03/2018</a:t>
             </a:fld>
             <a:endParaRPr lang="en-CA"/>
           </a:p>
@@ -2574,7 +2940,7 @@
           <a:p>
             <a:fld id="{E4A4F39D-5229-437F-8485-17CB22BA73AE}" type="datetimeFigureOut">
               <a:rPr lang="en-CA" smtClean="0"/>
-              <a:t>19/03/2018</a:t>
+              <a:t>21/03/2018</a:t>
             </a:fld>
             <a:endParaRPr lang="en-CA"/>
           </a:p>
@@ -2996,7 +3362,7 @@
         <p:spPr>
           <a:xfrm>
             <a:off x="381817" y="2828836"/>
-            <a:ext cx="8380366" cy="1200329"/>
+            <a:ext cx="8380366" cy="1477328"/>
           </a:xfrm>
           <a:prstGeom prst="rect">
             <a:avLst/>
@@ -3021,6 +3387,16 @@
               <a:t>You will be shown 15 plates. Please enter the number you see on each plate followed by Enter key.</a:t>
             </a:r>
             <a:endParaRPr lang="en-CA" dirty="0">
+              <a:solidFill>
+                <a:schemeClr val="bg1"/>
+              </a:solidFill>
+              <a:latin typeface="Arial" panose="020B0604020202020204" pitchFamily="34" charset="0"/>
+              <a:cs typeface="Arial" panose="020B0604020202020204" pitchFamily="34" charset="0"/>
+            </a:endParaRPr>
+          </a:p>
+          <a:p>
+            <a:pPr algn="ctr"/>
+            <a:endParaRPr lang="en-CA" dirty="0" smtClean="0">
               <a:solidFill>
                 <a:schemeClr val="bg1"/>
               </a:solidFill>
@@ -3057,6 +3433,260 @@
     <p:extLst>
       <p:ext uri="{BB962C8B-B14F-4D97-AF65-F5344CB8AC3E}">
         <p14:creationId xmlns:p14="http://schemas.microsoft.com/office/powerpoint/2010/main" val="3413571658"/>
+      </p:ext>
+    </p:extLst>
+  </p:cSld>
+  <p:clrMapOvr>
+    <a:masterClrMapping/>
+  </p:clrMapOvr>
+</p:sld>
+</file>
+
+<file path=ppt/slides/slide10.xml><?xml version="1.0" encoding="utf-8"?>
+<p:sld xmlns:a="http://schemas.openxmlformats.org/drawingml/2006/main" xmlns:r="http://schemas.openxmlformats.org/officeDocument/2006/relationships" xmlns:p="http://schemas.openxmlformats.org/presentationml/2006/main">
+  <p:cSld>
+    <p:bg>
+      <p:bgPr>
+        <a:solidFill>
+          <a:srgbClr val="808080"/>
+        </a:solidFill>
+        <a:effectLst/>
+      </p:bgPr>
+    </p:bg>
+    <p:spTree>
+      <p:nvGrpSpPr>
+        <p:cNvPr id="1" name=""/>
+        <p:cNvGrpSpPr/>
+        <p:nvPr/>
+      </p:nvGrpSpPr>
+      <p:grpSpPr>
+        <a:xfrm>
+          <a:off x="0" y="0"/>
+          <a:ext cx="0" cy="0"/>
+          <a:chOff x="0" y="0"/>
+          <a:chExt cx="0" cy="0"/>
+        </a:xfrm>
+      </p:grpSpPr>
+      <p:sp>
+        <p:nvSpPr>
+          <p:cNvPr id="4" name="TextBox 3"/>
+          <p:cNvSpPr txBox="1"/>
+          <p:nvPr/>
+        </p:nvSpPr>
+        <p:spPr>
+          <a:xfrm>
+            <a:off x="381817" y="2413338"/>
+            <a:ext cx="8380366" cy="2031325"/>
+          </a:xfrm>
+          <a:prstGeom prst="rect">
+            <a:avLst/>
+          </a:prstGeom>
+          <a:noFill/>
+        </p:spPr>
+        <p:txBody>
+          <a:bodyPr wrap="square" rtlCol="0">
+            <a:spAutoFit/>
+          </a:bodyPr>
+          <a:lstStyle/>
+          <a:p>
+            <a:pPr algn="ctr"/>
+            <a:r>
+              <a:rPr lang="en-CA" dirty="0">
+                <a:solidFill>
+                  <a:schemeClr val="bg1"/>
+                </a:solidFill>
+                <a:latin typeface="Arial" panose="020B0604020202020204" pitchFamily="34" charset="0"/>
+                <a:cs typeface="Arial" panose="020B0604020202020204" pitchFamily="34" charset="0"/>
+              </a:rPr>
+              <a:t>On each trial you will be presented with a letter stimulus.  In these trials, please focus on the big letter on the screen.  Upon stimulus presentation, indicate as </a:t>
+            </a:r>
+            <a:r>
+              <a:rPr lang="en-CA" i="1" dirty="0">
+                <a:solidFill>
+                  <a:schemeClr val="bg1"/>
+                </a:solidFill>
+                <a:latin typeface="Arial" panose="020B0604020202020204" pitchFamily="34" charset="0"/>
+                <a:cs typeface="Arial" panose="020B0604020202020204" pitchFamily="34" charset="0"/>
+              </a:rPr>
+              <a:t>quickly and accurately </a:t>
+            </a:r>
+            <a:r>
+              <a:rPr lang="en-CA" dirty="0">
+                <a:solidFill>
+                  <a:schemeClr val="bg1"/>
+                </a:solidFill>
+                <a:latin typeface="Arial" panose="020B0604020202020204" pitchFamily="34" charset="0"/>
+                <a:cs typeface="Arial" panose="020B0604020202020204" pitchFamily="34" charset="0"/>
+              </a:rPr>
+              <a:t>as possible the big letter you saw using the left and right arrow keys corresponding to your response.</a:t>
+            </a:r>
+          </a:p>
+          <a:p>
+            <a:pPr algn="ctr"/>
+            <a:endParaRPr lang="en-CA" dirty="0" smtClean="0">
+              <a:solidFill>
+                <a:schemeClr val="bg1"/>
+              </a:solidFill>
+              <a:latin typeface="Arial" panose="020B0604020202020204" pitchFamily="34" charset="0"/>
+              <a:cs typeface="Arial" panose="020B0604020202020204" pitchFamily="34" charset="0"/>
+            </a:endParaRPr>
+          </a:p>
+          <a:p>
+            <a:pPr algn="ctr"/>
+            <a:endParaRPr lang="en-CA" dirty="0">
+              <a:solidFill>
+                <a:schemeClr val="bg1"/>
+              </a:solidFill>
+              <a:latin typeface="Arial" panose="020B0604020202020204" pitchFamily="34" charset="0"/>
+              <a:cs typeface="Arial" panose="020B0604020202020204" pitchFamily="34" charset="0"/>
+            </a:endParaRPr>
+          </a:p>
+          <a:p>
+            <a:pPr algn="ctr"/>
+            <a:r>
+              <a:rPr lang="en-CA" dirty="0">
+                <a:solidFill>
+                  <a:schemeClr val="bg1"/>
+                </a:solidFill>
+                <a:latin typeface="Arial" panose="020B0604020202020204" pitchFamily="34" charset="0"/>
+                <a:cs typeface="Arial" panose="020B0604020202020204" pitchFamily="34" charset="0"/>
+              </a:rPr>
+              <a:t>Press the spacebar to begin</a:t>
+            </a:r>
+          </a:p>
+        </p:txBody>
+      </p:sp>
+    </p:spTree>
+    <p:extLst>
+      <p:ext uri="{BB962C8B-B14F-4D97-AF65-F5344CB8AC3E}">
+        <p14:creationId xmlns:p14="http://schemas.microsoft.com/office/powerpoint/2010/main" val="4067659435"/>
+      </p:ext>
+    </p:extLst>
+  </p:cSld>
+  <p:clrMapOvr>
+    <a:masterClrMapping/>
+  </p:clrMapOvr>
+</p:sld>
+</file>
+
+<file path=ppt/slides/slide11.xml><?xml version="1.0" encoding="utf-8"?>
+<p:sld xmlns:a="http://schemas.openxmlformats.org/drawingml/2006/main" xmlns:r="http://schemas.openxmlformats.org/officeDocument/2006/relationships" xmlns:p="http://schemas.openxmlformats.org/presentationml/2006/main">
+  <p:cSld>
+    <p:bg>
+      <p:bgPr>
+        <a:solidFill>
+          <a:srgbClr val="808080"/>
+        </a:solidFill>
+        <a:effectLst/>
+      </p:bgPr>
+    </p:bg>
+    <p:spTree>
+      <p:nvGrpSpPr>
+        <p:cNvPr id="1" name=""/>
+        <p:cNvGrpSpPr/>
+        <p:nvPr/>
+      </p:nvGrpSpPr>
+      <p:grpSpPr>
+        <a:xfrm>
+          <a:off x="0" y="0"/>
+          <a:ext cx="0" cy="0"/>
+          <a:chOff x="0" y="0"/>
+          <a:chExt cx="0" cy="0"/>
+        </a:xfrm>
+      </p:grpSpPr>
+      <p:sp>
+        <p:nvSpPr>
+          <p:cNvPr id="4" name="TextBox 3"/>
+          <p:cNvSpPr txBox="1"/>
+          <p:nvPr/>
+        </p:nvSpPr>
+        <p:spPr>
+          <a:xfrm>
+            <a:off x="381817" y="2413338"/>
+            <a:ext cx="8380366" cy="2031325"/>
+          </a:xfrm>
+          <a:prstGeom prst="rect">
+            <a:avLst/>
+          </a:prstGeom>
+          <a:noFill/>
+        </p:spPr>
+        <p:txBody>
+          <a:bodyPr wrap="square" rtlCol="0">
+            <a:spAutoFit/>
+          </a:bodyPr>
+          <a:lstStyle/>
+          <a:p>
+            <a:pPr algn="ctr"/>
+            <a:r>
+              <a:rPr lang="en-CA" dirty="0">
+                <a:solidFill>
+                  <a:schemeClr val="bg1"/>
+                </a:solidFill>
+                <a:latin typeface="Arial" panose="020B0604020202020204" pitchFamily="34" charset="0"/>
+                <a:cs typeface="Arial" panose="020B0604020202020204" pitchFamily="34" charset="0"/>
+              </a:rPr>
+              <a:t>On each trial you will be presented with a letter stimulus.  In these trials, please focus on the small letters on the screen.  Upon stimulus presentation, indicate </a:t>
+            </a:r>
+            <a:r>
+              <a:rPr lang="en-CA" i="1" dirty="0">
+                <a:solidFill>
+                  <a:schemeClr val="bg1"/>
+                </a:solidFill>
+                <a:latin typeface="Arial" panose="020B0604020202020204" pitchFamily="34" charset="0"/>
+                <a:cs typeface="Arial" panose="020B0604020202020204" pitchFamily="34" charset="0"/>
+              </a:rPr>
+              <a:t>as quickly and accurately</a:t>
+            </a:r>
+            <a:r>
+              <a:rPr lang="en-CA" dirty="0">
+                <a:solidFill>
+                  <a:schemeClr val="bg1"/>
+                </a:solidFill>
+                <a:latin typeface="Arial" panose="020B0604020202020204" pitchFamily="34" charset="0"/>
+                <a:cs typeface="Arial" panose="020B0604020202020204" pitchFamily="34" charset="0"/>
+              </a:rPr>
+              <a:t> as possible the small letters you saw using the left and right arrow keys corresponding to your response.</a:t>
+            </a:r>
+          </a:p>
+          <a:p>
+            <a:pPr algn="ctr"/>
+            <a:endParaRPr lang="en-CA" dirty="0" smtClean="0">
+              <a:solidFill>
+                <a:schemeClr val="bg1"/>
+              </a:solidFill>
+              <a:latin typeface="Arial" panose="020B0604020202020204" pitchFamily="34" charset="0"/>
+              <a:cs typeface="Arial" panose="020B0604020202020204" pitchFamily="34" charset="0"/>
+            </a:endParaRPr>
+          </a:p>
+          <a:p>
+            <a:pPr algn="ctr"/>
+            <a:endParaRPr lang="en-CA" dirty="0">
+              <a:solidFill>
+                <a:schemeClr val="bg1"/>
+              </a:solidFill>
+              <a:latin typeface="Arial" panose="020B0604020202020204" pitchFamily="34" charset="0"/>
+              <a:cs typeface="Arial" panose="020B0604020202020204" pitchFamily="34" charset="0"/>
+            </a:endParaRPr>
+          </a:p>
+          <a:p>
+            <a:pPr algn="ctr"/>
+            <a:r>
+              <a:rPr lang="en-CA" dirty="0">
+                <a:solidFill>
+                  <a:schemeClr val="bg1"/>
+                </a:solidFill>
+                <a:latin typeface="Arial" panose="020B0604020202020204" pitchFamily="34" charset="0"/>
+                <a:cs typeface="Arial" panose="020B0604020202020204" pitchFamily="34" charset="0"/>
+              </a:rPr>
+              <a:t>Press the spacebar to begin</a:t>
+            </a:r>
+          </a:p>
+        </p:txBody>
+      </p:sp>
+    </p:spTree>
+    <p:extLst>
+      <p:ext uri="{BB962C8B-B14F-4D97-AF65-F5344CB8AC3E}">
+        <p14:creationId xmlns:p14="http://schemas.microsoft.com/office/powerpoint/2010/main" val="1268726990"/>
       </p:ext>
     </p:extLst>
   </p:cSld>
@@ -3100,7 +3730,7 @@
         <p:spPr>
           <a:xfrm>
             <a:off x="381817" y="2274838"/>
-            <a:ext cx="8380366" cy="2308324"/>
+            <a:ext cx="8380366" cy="2585323"/>
           </a:xfrm>
           <a:prstGeom prst="rect">
             <a:avLst/>
@@ -3122,7 +3752,47 @@
                 <a:latin typeface="Arial" panose="020B0604020202020204" pitchFamily="34" charset="0"/>
                 <a:cs typeface="Arial" panose="020B0604020202020204" pitchFamily="34" charset="0"/>
               </a:rPr>
-              <a:t>On these trials you will be shown grey line drawings.  Please indicate if you detect the line drawing by pressing the left arrow key if it’s detected and right arrow key if it’s not detected.  The next trial will begin immediately following your response.</a:t>
+              <a:t>On these trials you will be shown grey line drawings.  Please indicate if you detect the line drawing by pressing the </a:t>
+            </a:r>
+            <a:r>
+              <a:rPr lang="en-CA" dirty="0" smtClean="0">
+                <a:solidFill>
+                  <a:schemeClr val="bg1"/>
+                </a:solidFill>
+                <a:latin typeface="Arial" panose="020B0604020202020204" pitchFamily="34" charset="0"/>
+                <a:cs typeface="Arial" panose="020B0604020202020204" pitchFamily="34" charset="0"/>
+              </a:rPr>
+              <a:t>right </a:t>
+            </a:r>
+            <a:r>
+              <a:rPr lang="en-CA" dirty="0">
+                <a:solidFill>
+                  <a:schemeClr val="bg1"/>
+                </a:solidFill>
+                <a:latin typeface="Arial" panose="020B0604020202020204" pitchFamily="34" charset="0"/>
+                <a:cs typeface="Arial" panose="020B0604020202020204" pitchFamily="34" charset="0"/>
+              </a:rPr>
+              <a:t>arrow key if it’s detected and </a:t>
+            </a:r>
+            <a:r>
+              <a:rPr lang="en-CA" dirty="0" smtClean="0">
+                <a:solidFill>
+                  <a:schemeClr val="bg1"/>
+                </a:solidFill>
+                <a:latin typeface="Arial" panose="020B0604020202020204" pitchFamily="34" charset="0"/>
+                <a:cs typeface="Arial" panose="020B0604020202020204" pitchFamily="34" charset="0"/>
+              </a:rPr>
+              <a:t>left </a:t>
+            </a:r>
+            <a:r>
+              <a:rPr lang="en-CA" dirty="0">
+                <a:solidFill>
+                  <a:schemeClr val="bg1"/>
+                </a:solidFill>
+                <a:latin typeface="Arial" panose="020B0604020202020204" pitchFamily="34" charset="0"/>
+                <a:cs typeface="Arial" panose="020B0604020202020204" pitchFamily="34" charset="0"/>
+              </a:rPr>
+              <a:t>arrow key if it’s not detected.  The next trial will begin immediately following your response.</a:t>
             </a:r>
           </a:p>
           <a:p>
@@ -3151,6 +3821,17 @@
               <a:t>Not Detected </a:t>
             </a:r>
             <a:r>
+              <a:rPr lang="en-CA" dirty="0" smtClean="0">
+                <a:solidFill>
+                  <a:schemeClr val="bg1"/>
+                </a:solidFill>
+                <a:latin typeface="Arial" panose="020B0604020202020204" pitchFamily="34" charset="0"/>
+                <a:cs typeface="Arial" panose="020B0604020202020204" pitchFamily="34" charset="0"/>
+                <a:sym typeface="Wingdings" panose="05000000000000000000" pitchFamily="2" charset="2"/>
+              </a:rPr>
+              <a:t></a:t>
+            </a:r>
+            <a:r>
               <a:rPr lang="en-CA" dirty="0">
                 <a:solidFill>
                   <a:schemeClr val="bg1"/>
@@ -3159,20 +3840,10 @@
                 <a:cs typeface="Arial" panose="020B0604020202020204" pitchFamily="34" charset="0"/>
                 <a:sym typeface="Wingdings" panose="05000000000000000000" pitchFamily="2" charset="2"/>
               </a:rPr>
-              <a:t></a:t>
-            </a:r>
-            <a:r>
-              <a:rPr lang="en-CA" dirty="0">
-                <a:solidFill>
-                  <a:schemeClr val="bg1"/>
-                </a:solidFill>
-                <a:latin typeface="Arial" panose="020B0604020202020204" pitchFamily="34" charset="0"/>
-                <a:cs typeface="Arial" panose="020B0604020202020204" pitchFamily="34" charset="0"/>
-              </a:rPr>
-              <a:t>		</a:t>
-            </a:r>
-            <a:r>
-              <a:rPr lang="en-CA" dirty="0">
+              <a:t>	</a:t>
+            </a:r>
+            <a:r>
+              <a:rPr lang="en-CA" dirty="0" smtClean="0">
                 <a:solidFill>
                   <a:schemeClr val="bg1"/>
                 </a:solidFill>
@@ -3180,10 +3851,10 @@
                 <a:cs typeface="Arial" panose="020B0604020202020204" pitchFamily="34" charset="0"/>
                 <a:sym typeface="Wingdings" panose="05000000000000000000" pitchFamily="2" charset="2"/>
               </a:rPr>
-              <a:t></a:t>
-            </a:r>
-            <a:r>
-              <a:rPr lang="en-CA" dirty="0">
+              <a:t>	</a:t>
+            </a:r>
+            <a:r>
+              <a:rPr lang="en-CA" dirty="0" smtClean="0">
                 <a:solidFill>
                   <a:schemeClr val="bg1"/>
                 </a:solidFill>
@@ -3192,6 +3863,16 @@
               </a:rPr>
               <a:t> Detected</a:t>
             </a:r>
+          </a:p>
+          <a:p>
+            <a:pPr algn="ctr"/>
+            <a:endParaRPr lang="en-CA" dirty="0">
+              <a:solidFill>
+                <a:schemeClr val="bg1"/>
+              </a:solidFill>
+              <a:latin typeface="Arial" panose="020B0604020202020204" pitchFamily="34" charset="0"/>
+              <a:cs typeface="Arial" panose="020B0604020202020204" pitchFamily="34" charset="0"/>
+            </a:endParaRPr>
           </a:p>
           <a:p>
             <a:pPr algn="ctr"/>
@@ -3264,8 +3945,8 @@
         </p:nvSpPr>
         <p:spPr>
           <a:xfrm>
-            <a:off x="381817" y="2690336"/>
-            <a:ext cx="8380366" cy="1477328"/>
+            <a:off x="381817" y="2551837"/>
+            <a:ext cx="8380366" cy="1754326"/>
           </a:xfrm>
           <a:prstGeom prst="rect">
             <a:avLst/>
@@ -3287,8 +3968,28 @@
                 <a:latin typeface="Arial" panose="020B0604020202020204" pitchFamily="34" charset="0"/>
                 <a:cs typeface="Arial" panose="020B0604020202020204" pitchFamily="34" charset="0"/>
               </a:rPr>
-              <a:t>On these trials you will be shown flickering line drawings.  Use the up and down arrow keys to adjust the flicker until it is no longer detected. The next trial will begin immediately following your response.</a:t>
-            </a:r>
+              <a:t>On these trials you will be shown flickering line drawings.  Use the up and down arrow keys to adjust the flicker until it is no longer detected. The next trial will begin immediately following your response</a:t>
+            </a:r>
+            <a:r>
+              <a:rPr lang="en-CA" dirty="0" smtClean="0">
+                <a:solidFill>
+                  <a:schemeClr val="bg1"/>
+                </a:solidFill>
+                <a:latin typeface="Arial" panose="020B0604020202020204" pitchFamily="34" charset="0"/>
+                <a:cs typeface="Arial" panose="020B0604020202020204" pitchFamily="34" charset="0"/>
+              </a:rPr>
+              <a:t>.</a:t>
+            </a:r>
+          </a:p>
+          <a:p>
+            <a:pPr algn="ctr"/>
+            <a:endParaRPr lang="en-CA" dirty="0">
+              <a:solidFill>
+                <a:schemeClr val="bg1"/>
+              </a:solidFill>
+              <a:latin typeface="Arial" panose="020B0604020202020204" pitchFamily="34" charset="0"/>
+              <a:cs typeface="Arial" panose="020B0604020202020204" pitchFamily="34" charset="0"/>
+            </a:endParaRPr>
           </a:p>
           <a:p>
             <a:pPr algn="ctr"/>
@@ -3361,8 +4062,8 @@
         </p:nvSpPr>
         <p:spPr>
           <a:xfrm>
-            <a:off x="381817" y="2690336"/>
-            <a:ext cx="8380366" cy="923330"/>
+            <a:off x="381817" y="2828836"/>
+            <a:ext cx="8380366" cy="1200329"/>
           </a:xfrm>
           <a:prstGeom prst="rect">
             <a:avLst/>
@@ -3384,8 +4085,21 @@
                 <a:latin typeface="Arial" panose="020B0604020202020204" pitchFamily="34" charset="0"/>
                 <a:cs typeface="Arial" panose="020B0604020202020204" pitchFamily="34" charset="0"/>
               </a:rPr>
-              <a:t>On the next set of trials, use up key to adjust the flicker.</a:t>
-            </a:r>
+              <a:t>On the next set of trials, use up key to adjust the flicker</a:t>
+            </a:r>
+            <a:r>
+              <a:rPr lang="en-CA" dirty="0" smtClean="0">
+                <a:solidFill>
+                  <a:schemeClr val="bg1"/>
+                </a:solidFill>
+                <a:latin typeface="Arial" panose="020B0604020202020204" pitchFamily="34" charset="0"/>
+                <a:cs typeface="Arial" panose="020B0604020202020204" pitchFamily="34" charset="0"/>
+              </a:rPr>
+              <a:t>.</a:t>
+            </a:r>
+          </a:p>
+          <a:p>
+            <a:pPr algn="ctr"/>
             <a:endParaRPr lang="en-CA" dirty="0">
               <a:solidFill>
                 <a:schemeClr val="bg1"/>
@@ -3482,8 +4196,8 @@
         </p:nvSpPr>
         <p:spPr>
           <a:xfrm>
-            <a:off x="381817" y="2690336"/>
-            <a:ext cx="8380366" cy="923330"/>
+            <a:off x="381817" y="2828836"/>
+            <a:ext cx="8380366" cy="1200329"/>
           </a:xfrm>
           <a:prstGeom prst="rect">
             <a:avLst/>
@@ -3505,27 +4219,7 @@
                 <a:latin typeface="Arial" panose="020B0604020202020204" pitchFamily="34" charset="0"/>
                 <a:cs typeface="Arial" panose="020B0604020202020204" pitchFamily="34" charset="0"/>
               </a:rPr>
-              <a:t>On the next set of trials, </a:t>
-            </a:r>
-            <a:r>
-              <a:rPr lang="en-CA" smtClean="0">
-                <a:solidFill>
-                  <a:schemeClr val="bg1"/>
-                </a:solidFill>
-                <a:latin typeface="Arial" panose="020B0604020202020204" pitchFamily="34" charset="0"/>
-                <a:cs typeface="Arial" panose="020B0604020202020204" pitchFamily="34" charset="0"/>
-              </a:rPr>
-              <a:t>use down key </a:t>
-            </a:r>
-            <a:r>
-              <a:rPr lang="en-CA" dirty="0" smtClean="0">
-                <a:solidFill>
-                  <a:schemeClr val="bg1"/>
-                </a:solidFill>
-                <a:latin typeface="Arial" panose="020B0604020202020204" pitchFamily="34" charset="0"/>
-                <a:cs typeface="Arial" panose="020B0604020202020204" pitchFamily="34" charset="0"/>
-              </a:rPr>
-              <a:t>to adjust the flicker.</a:t>
+              <a:t>On the next set of trials, use down key to adjust the flicker.</a:t>
             </a:r>
             <a:endParaRPr lang="en-CA" dirty="0">
               <a:solidFill>
@@ -3547,6 +4241,26 @@
           </a:p>
           <a:p>
             <a:pPr algn="ctr"/>
+            <a:endParaRPr lang="en-CA" dirty="0" smtClean="0">
+              <a:solidFill>
+                <a:schemeClr val="bg1"/>
+              </a:solidFill>
+              <a:latin typeface="Arial" panose="020B0604020202020204" pitchFamily="34" charset="0"/>
+              <a:cs typeface="Arial" panose="020B0604020202020204" pitchFamily="34" charset="0"/>
+            </a:endParaRPr>
+          </a:p>
+          <a:p>
+            <a:pPr algn="ctr"/>
+            <a:r>
+              <a:rPr lang="en-CA" dirty="0" smtClean="0">
+                <a:solidFill>
+                  <a:schemeClr val="bg1"/>
+                </a:solidFill>
+                <a:latin typeface="Arial" panose="020B0604020202020204" pitchFamily="34" charset="0"/>
+                <a:cs typeface="Arial" panose="020B0604020202020204" pitchFamily="34" charset="0"/>
+              </a:rPr>
+              <a:t>Press </a:t>
+            </a:r>
             <a:r>
               <a:rPr lang="en-CA" dirty="0">
                 <a:solidFill>
@@ -3555,7 +4269,7 @@
                 <a:latin typeface="Arial" panose="020B0604020202020204" pitchFamily="34" charset="0"/>
                 <a:cs typeface="Arial" panose="020B0604020202020204" pitchFamily="34" charset="0"/>
               </a:rPr>
-              <a:t>Press the spacebar to </a:t>
+              <a:t>the spacebar to </a:t>
             </a:r>
             <a:r>
               <a:rPr lang="en-CA" dirty="0" smtClean="0">
@@ -3623,8 +4337,8 @@
         </p:nvSpPr>
         <p:spPr>
           <a:xfrm>
-            <a:off x="381817" y="2413338"/>
-            <a:ext cx="8380366" cy="2031325"/>
+            <a:off x="381817" y="2274838"/>
+            <a:ext cx="8380366" cy="2308324"/>
           </a:xfrm>
           <a:prstGeom prst="rect">
             <a:avLst/>
@@ -3669,8 +4383,28 @@
                 <a:latin typeface="Arial" panose="020B0604020202020204" pitchFamily="34" charset="0"/>
                 <a:cs typeface="Arial" panose="020B0604020202020204" pitchFamily="34" charset="0"/>
               </a:rPr>
-              <a:t>Two response options will be shown immediately following the stimulus.  Press the left or right arrow key corresponding with your response.</a:t>
-            </a:r>
+              <a:t>Two response options will be shown immediately following the stimulus.  Press the left or right arrow key corresponding with your response</a:t>
+            </a:r>
+            <a:r>
+              <a:rPr lang="en-CA" dirty="0" smtClean="0">
+                <a:solidFill>
+                  <a:schemeClr val="bg1"/>
+                </a:solidFill>
+                <a:latin typeface="Arial" panose="020B0604020202020204" pitchFamily="34" charset="0"/>
+                <a:cs typeface="Arial" panose="020B0604020202020204" pitchFamily="34" charset="0"/>
+              </a:rPr>
+              <a:t>.</a:t>
+            </a:r>
+          </a:p>
+          <a:p>
+            <a:pPr algn="ctr"/>
+            <a:endParaRPr lang="en-CA" dirty="0">
+              <a:solidFill>
+                <a:schemeClr val="bg1"/>
+              </a:solidFill>
+              <a:latin typeface="Arial" panose="020B0604020202020204" pitchFamily="34" charset="0"/>
+              <a:cs typeface="Arial" panose="020B0604020202020204" pitchFamily="34" charset="0"/>
+            </a:endParaRPr>
           </a:p>
           <a:p>
             <a:pPr algn="ctr"/>
@@ -3743,8 +4477,8 @@
         </p:nvSpPr>
         <p:spPr>
           <a:xfrm>
-            <a:off x="381817" y="2413338"/>
-            <a:ext cx="8380366" cy="2031325"/>
+            <a:off x="381817" y="2274838"/>
+            <a:ext cx="8380366" cy="2308324"/>
           </a:xfrm>
           <a:prstGeom prst="rect">
             <a:avLst/>
@@ -3766,7 +4500,7 @@
                 <a:latin typeface="Arial" panose="020B0604020202020204" pitchFamily="34" charset="0"/>
                 <a:cs typeface="Arial" panose="020B0604020202020204" pitchFamily="34" charset="0"/>
               </a:rPr>
-              <a:t>On each trial you will be presented with a letter stimulus.  Press the left arrow key if you see the letter </a:t>
+              <a:t>On each trial you will be presented with a letter stimulus.  Press the </a:t>
             </a:r>
             <a:r>
               <a:rPr lang="en-CA" dirty="0" smtClean="0">
@@ -3776,6 +4510,26 @@
                 <a:latin typeface="Arial" panose="020B0604020202020204" pitchFamily="34" charset="0"/>
                 <a:cs typeface="Arial" panose="020B0604020202020204" pitchFamily="34" charset="0"/>
               </a:rPr>
+              <a:t>right </a:t>
+            </a:r>
+            <a:r>
+              <a:rPr lang="en-CA" dirty="0">
+                <a:solidFill>
+                  <a:schemeClr val="bg1"/>
+                </a:solidFill>
+                <a:latin typeface="Arial" panose="020B0604020202020204" pitchFamily="34" charset="0"/>
+                <a:cs typeface="Arial" panose="020B0604020202020204" pitchFamily="34" charset="0"/>
+              </a:rPr>
+              <a:t>arrow key if you see the letter </a:t>
+            </a:r>
+            <a:r>
+              <a:rPr lang="en-CA" dirty="0" smtClean="0">
+                <a:solidFill>
+                  <a:schemeClr val="bg1"/>
+                </a:solidFill>
+                <a:latin typeface="Arial" panose="020B0604020202020204" pitchFamily="34" charset="0"/>
+                <a:cs typeface="Arial" panose="020B0604020202020204" pitchFamily="34" charset="0"/>
+              </a:rPr>
               <a:t>‘H’ </a:t>
             </a:r>
             <a:r>
@@ -3786,7 +4540,27 @@
                 <a:latin typeface="Arial" panose="020B0604020202020204" pitchFamily="34" charset="0"/>
                 <a:cs typeface="Arial" panose="020B0604020202020204" pitchFamily="34" charset="0"/>
               </a:rPr>
-              <a:t>and the right arrow key if you do not see the letter </a:t>
+              <a:t>and the </a:t>
+            </a:r>
+            <a:r>
+              <a:rPr lang="en-CA" dirty="0" smtClean="0">
+                <a:solidFill>
+                  <a:schemeClr val="bg1"/>
+                </a:solidFill>
+                <a:latin typeface="Arial" panose="020B0604020202020204" pitchFamily="34" charset="0"/>
+                <a:cs typeface="Arial" panose="020B0604020202020204" pitchFamily="34" charset="0"/>
+              </a:rPr>
+              <a:t>left </a:t>
+            </a:r>
+            <a:r>
+              <a:rPr lang="en-CA" dirty="0">
+                <a:solidFill>
+                  <a:schemeClr val="bg1"/>
+                </a:solidFill>
+                <a:latin typeface="Arial" panose="020B0604020202020204" pitchFamily="34" charset="0"/>
+                <a:cs typeface="Arial" panose="020B0604020202020204" pitchFamily="34" charset="0"/>
+              </a:rPr>
+              <a:t>arrow key if you do not see the letter </a:t>
             </a:r>
             <a:r>
               <a:rPr lang="en-CA" dirty="0" smtClean="0">
@@ -3871,8 +4645,21 @@
                 <a:latin typeface="Arial" panose="020B0604020202020204" pitchFamily="34" charset="0"/>
                 <a:cs typeface="Arial" panose="020B0604020202020204" pitchFamily="34" charset="0"/>
               </a:rPr>
-              <a:t> Present</a:t>
-            </a:r>
+              <a:t> </a:t>
+            </a:r>
+            <a:r>
+              <a:rPr lang="en-CA" dirty="0" smtClean="0">
+                <a:solidFill>
+                  <a:schemeClr val="bg1"/>
+                </a:solidFill>
+                <a:latin typeface="Arial" panose="020B0604020202020204" pitchFamily="34" charset="0"/>
+                <a:cs typeface="Arial" panose="020B0604020202020204" pitchFamily="34" charset="0"/>
+              </a:rPr>
+              <a:t>Present</a:t>
+            </a:r>
+          </a:p>
+          <a:p>
+            <a:pPr algn="ctr"/>
             <a:endParaRPr lang="en-CA" dirty="0">
               <a:solidFill>
                 <a:schemeClr val="bg1"/>
@@ -3952,8 +4739,8 @@
         </p:nvSpPr>
         <p:spPr>
           <a:xfrm>
-            <a:off x="381817" y="2274838"/>
-            <a:ext cx="8380366" cy="1754326"/>
+            <a:off x="381817" y="2828836"/>
+            <a:ext cx="8380366" cy="1200329"/>
           </a:xfrm>
           <a:prstGeom prst="rect">
             <a:avLst/>
@@ -3968,35 +4755,22 @@
           <a:p>
             <a:pPr algn="ctr"/>
             <a:r>
-              <a:rPr lang="en-CA" dirty="0">
-                <a:solidFill>
-                  <a:schemeClr val="bg1"/>
-                </a:solidFill>
-                <a:latin typeface="Arial" panose="020B0604020202020204" pitchFamily="34" charset="0"/>
-                <a:cs typeface="Arial" panose="020B0604020202020204" pitchFamily="34" charset="0"/>
-              </a:rPr>
-              <a:t>On each trial you will be presented with a letter stimulus.  In these trials, please focus on the big letter on the screen.  Upon stimulus presentation, indicate as </a:t>
-            </a:r>
-            <a:r>
-              <a:rPr lang="en-CA" i="1" dirty="0">
-                <a:solidFill>
-                  <a:schemeClr val="bg1"/>
-                </a:solidFill>
-                <a:latin typeface="Arial" panose="020B0604020202020204" pitchFamily="34" charset="0"/>
-                <a:cs typeface="Arial" panose="020B0604020202020204" pitchFamily="34" charset="0"/>
-              </a:rPr>
-              <a:t>quickly and accurately </a:t>
-            </a:r>
-            <a:r>
-              <a:rPr lang="en-CA" dirty="0">
-                <a:solidFill>
-                  <a:schemeClr val="bg1"/>
-                </a:solidFill>
-                <a:latin typeface="Arial" panose="020B0604020202020204" pitchFamily="34" charset="0"/>
-                <a:cs typeface="Arial" panose="020B0604020202020204" pitchFamily="34" charset="0"/>
-              </a:rPr>
-              <a:t>as possible the big letter you saw using the left and right arrow keys corresponding to your response.</a:t>
-            </a:r>
+              <a:rPr lang="en-CA" dirty="0" smtClean="0">
+                <a:solidFill>
+                  <a:schemeClr val="bg1"/>
+                </a:solidFill>
+                <a:latin typeface="Arial" panose="020B0604020202020204" pitchFamily="34" charset="0"/>
+                <a:cs typeface="Arial" panose="020B0604020202020204" pitchFamily="34" charset="0"/>
+              </a:rPr>
+              <a:t>The first 12 trials are for practice</a:t>
+            </a:r>
+            <a:endParaRPr lang="en-CA" dirty="0">
+              <a:solidFill>
+                <a:schemeClr val="bg1"/>
+              </a:solidFill>
+              <a:latin typeface="Arial" panose="020B0604020202020204" pitchFamily="34" charset="0"/>
+              <a:cs typeface="Arial" panose="020B0604020202020204" pitchFamily="34" charset="0"/>
+            </a:endParaRPr>
           </a:p>
           <a:p>
             <a:pPr algn="ctr"/>
@@ -4010,6 +4784,16 @@
           </a:p>
           <a:p>
             <a:pPr algn="ctr"/>
+            <a:endParaRPr lang="en-CA" dirty="0">
+              <a:solidFill>
+                <a:schemeClr val="bg1"/>
+              </a:solidFill>
+              <a:latin typeface="Arial" panose="020B0604020202020204" pitchFamily="34" charset="0"/>
+              <a:cs typeface="Arial" panose="020B0604020202020204" pitchFamily="34" charset="0"/>
+            </a:endParaRPr>
+          </a:p>
+          <a:p>
+            <a:pPr algn="ctr"/>
             <a:r>
               <a:rPr lang="en-CA" dirty="0">
                 <a:solidFill>
@@ -4026,7 +4810,7 @@
     </p:spTree>
     <p:extLst>
       <p:ext uri="{BB962C8B-B14F-4D97-AF65-F5344CB8AC3E}">
-        <p14:creationId xmlns:p14="http://schemas.microsoft.com/office/powerpoint/2010/main" val="4067659435"/>
+        <p14:creationId xmlns:p14="http://schemas.microsoft.com/office/powerpoint/2010/main" val="2940439524"/>
       </p:ext>
     </p:extLst>
   </p:cSld>
@@ -4069,8 +4853,8 @@
         </p:nvSpPr>
         <p:spPr>
           <a:xfrm>
-            <a:off x="381817" y="2274838"/>
-            <a:ext cx="8380366" cy="1754326"/>
+            <a:off x="381817" y="2690336"/>
+            <a:ext cx="8380366" cy="1477328"/>
           </a:xfrm>
           <a:prstGeom prst="rect">
             <a:avLst/>
@@ -4085,6 +4869,16 @@
           <a:p>
             <a:pPr algn="ctr"/>
             <a:r>
+              <a:rPr lang="en-CA" dirty="0" smtClean="0">
+                <a:solidFill>
+                  <a:schemeClr val="bg1"/>
+                </a:solidFill>
+                <a:latin typeface="Arial" panose="020B0604020202020204" pitchFamily="34" charset="0"/>
+                <a:cs typeface="Arial" panose="020B0604020202020204" pitchFamily="34" charset="0"/>
+              </a:rPr>
+              <a:t>The following 90 trials will be </a:t>
+            </a:r>
+            <a:r>
               <a:rPr lang="en-CA" dirty="0">
                 <a:solidFill>
                   <a:schemeClr val="bg1"/>
@@ -4092,8 +4886,35 @@
                 <a:latin typeface="Arial" panose="020B0604020202020204" pitchFamily="34" charset="0"/>
                 <a:cs typeface="Arial" panose="020B0604020202020204" pitchFamily="34" charset="0"/>
               </a:rPr>
-              <a:t>On each trial you will be presented with a letter stimulus.  In these trials, please focus on the small letters on the screen.  Upon stimulus presentation, indicate as quickly and accurately as possible the small letters you saw using the left and right arrow keys corresponding to your response.</a:t>
-            </a:r>
+              <a:t>recorded. </a:t>
+            </a:r>
+            <a:r>
+              <a:rPr lang="en-CA" dirty="0" smtClean="0">
+                <a:solidFill>
+                  <a:schemeClr val="bg1"/>
+                </a:solidFill>
+                <a:latin typeface="Arial" panose="020B0604020202020204" pitchFamily="34" charset="0"/>
+                <a:cs typeface="Arial" panose="020B0604020202020204" pitchFamily="34" charset="0"/>
+              </a:rPr>
+              <a:t>Please respond as quickly and accurately as possible.</a:t>
+            </a:r>
+            <a:endParaRPr lang="en-CA" dirty="0">
+              <a:solidFill>
+                <a:schemeClr val="bg1"/>
+              </a:solidFill>
+              <a:latin typeface="Arial" panose="020B0604020202020204" pitchFamily="34" charset="0"/>
+              <a:cs typeface="Arial" panose="020B0604020202020204" pitchFamily="34" charset="0"/>
+            </a:endParaRPr>
+          </a:p>
+          <a:p>
+            <a:pPr algn="ctr"/>
+            <a:endParaRPr lang="en-CA" dirty="0" smtClean="0">
+              <a:solidFill>
+                <a:schemeClr val="bg1"/>
+              </a:solidFill>
+              <a:latin typeface="Arial" panose="020B0604020202020204" pitchFamily="34" charset="0"/>
+              <a:cs typeface="Arial" panose="020B0604020202020204" pitchFamily="34" charset="0"/>
+            </a:endParaRPr>
           </a:p>
           <a:p>
             <a:pPr algn="ctr"/>
@@ -4123,7 +4944,7 @@
     </p:spTree>
     <p:extLst>
       <p:ext uri="{BB962C8B-B14F-4D97-AF65-F5344CB8AC3E}">
-        <p14:creationId xmlns:p14="http://schemas.microsoft.com/office/powerpoint/2010/main" val="1268726990"/>
+        <p14:creationId xmlns:p14="http://schemas.microsoft.com/office/powerpoint/2010/main" val="3709970437"/>
       </p:ext>
     </p:extLst>
   </p:cSld>
@@ -4392,4 +5213,265 @@
     </a:ext>
   </a:extLst>
 </a:theme>
+</file>
+
+<file path=ppt/theme/theme2.xml><?xml version="1.0" encoding="utf-8"?>
+<a:theme xmlns:a="http://schemas.openxmlformats.org/drawingml/2006/main" name="Office Theme">
+  <a:themeElements>
+    <a:clrScheme name="Office">
+      <a:dk1>
+        <a:sysClr val="windowText" lastClr="000000"/>
+      </a:dk1>
+      <a:lt1>
+        <a:sysClr val="window" lastClr="FFFFFF"/>
+      </a:lt1>
+      <a:dk2>
+        <a:srgbClr val="44546A"/>
+      </a:dk2>
+      <a:lt2>
+        <a:srgbClr val="E7E6E6"/>
+      </a:lt2>
+      <a:accent1>
+        <a:srgbClr val="5B9BD5"/>
+      </a:accent1>
+      <a:accent2>
+        <a:srgbClr val="ED7D31"/>
+      </a:accent2>
+      <a:accent3>
+        <a:srgbClr val="A5A5A5"/>
+      </a:accent3>
+      <a:accent4>
+        <a:srgbClr val="FFC000"/>
+      </a:accent4>
+      <a:accent5>
+        <a:srgbClr val="4472C4"/>
+      </a:accent5>
+      <a:accent6>
+        <a:srgbClr val="70AD47"/>
+      </a:accent6>
+      <a:hlink>
+        <a:srgbClr val="0563C1"/>
+      </a:hlink>
+      <a:folHlink>
+        <a:srgbClr val="954F72"/>
+      </a:folHlink>
+    </a:clrScheme>
+    <a:fontScheme name="Office">
+      <a:majorFont>
+        <a:latin typeface="Calibri Light" panose="020F0302020204030204"/>
+        <a:ea typeface=""/>
+        <a:cs typeface=""/>
+        <a:font script="Jpan" typeface="游ゴシック Light"/>
+        <a:font script="Hang" typeface="맑은 고딕"/>
+        <a:font script="Hans" typeface="等线 Light"/>
+        <a:font script="Hant" typeface="新細明體"/>
+        <a:font script="Arab" typeface="Times New Roman"/>
+        <a:font script="Hebr" typeface="Times New Roman"/>
+        <a:font script="Thai" typeface="Angsana New"/>
+        <a:font script="Ethi" typeface="Nyala"/>
+        <a:font script="Beng" typeface="Vrinda"/>
+        <a:font script="Gujr" typeface="Shruti"/>
+        <a:font script="Khmr" typeface="MoolBoran"/>
+        <a:font script="Knda" typeface="Tunga"/>
+        <a:font script="Guru" typeface="Raavi"/>
+        <a:font script="Cans" typeface="Euphemia"/>
+        <a:font script="Cher" typeface="Plantagenet Cherokee"/>
+        <a:font script="Yiii" typeface="Microsoft Yi Baiti"/>
+        <a:font script="Tibt" typeface="Microsoft Himalaya"/>
+        <a:font script="Thaa" typeface="MV Boli"/>
+        <a:font script="Deva" typeface="Mangal"/>
+        <a:font script="Telu" typeface="Gautami"/>
+        <a:font script="Taml" typeface="Latha"/>
+        <a:font script="Syrc" typeface="Estrangelo Edessa"/>
+        <a:font script="Orya" typeface="Kalinga"/>
+        <a:font script="Mlym" typeface="Kartika"/>
+        <a:font script="Laoo" typeface="DokChampa"/>
+        <a:font script="Sinh" typeface="Iskoola Pota"/>
+        <a:font script="Mong" typeface="Mongolian Baiti"/>
+        <a:font script="Viet" typeface="Times New Roman"/>
+        <a:font script="Uigh" typeface="Microsoft Uighur"/>
+        <a:font script="Geor" typeface="Sylfaen"/>
+      </a:majorFont>
+      <a:minorFont>
+        <a:latin typeface="Calibri" panose="020F0502020204030204"/>
+        <a:ea typeface=""/>
+        <a:cs typeface=""/>
+        <a:font script="Jpan" typeface="游ゴシック"/>
+        <a:font script="Hang" typeface="맑은 고딕"/>
+        <a:font script="Hans" typeface="等线"/>
+        <a:font script="Hant" typeface="新細明體"/>
+        <a:font script="Arab" typeface="Arial"/>
+        <a:font script="Hebr" typeface="Arial"/>
+        <a:font script="Thai" typeface="Cordia New"/>
+        <a:font script="Ethi" typeface="Nyala"/>
+        <a:font script="Beng" typeface="Vrinda"/>
+        <a:font script="Gujr" typeface="Shruti"/>
+        <a:font script="Khmr" typeface="DaunPenh"/>
+        <a:font script="Knda" typeface="Tunga"/>
+        <a:font script="Guru" typeface="Raavi"/>
+        <a:font script="Cans" typeface="Euphemia"/>
+        <a:font script="Cher" typeface="Plantagenet Cherokee"/>
+        <a:font script="Yiii" typeface="Microsoft Yi Baiti"/>
+        <a:font script="Tibt" typeface="Microsoft Himalaya"/>
+        <a:font script="Thaa" typeface="MV Boli"/>
+        <a:font script="Deva" typeface="Mangal"/>
+        <a:font script="Telu" typeface="Gautami"/>
+        <a:font script="Taml" typeface="Latha"/>
+        <a:font script="Syrc" typeface="Estrangelo Edessa"/>
+        <a:font script="Orya" typeface="Kalinga"/>
+        <a:font script="Mlym" typeface="Kartika"/>
+        <a:font script="Laoo" typeface="DokChampa"/>
+        <a:font script="Sinh" typeface="Iskoola Pota"/>
+        <a:font script="Mong" typeface="Mongolian Baiti"/>
+        <a:font script="Viet" typeface="Arial"/>
+        <a:font script="Uigh" typeface="Microsoft Uighur"/>
+        <a:font script="Geor" typeface="Sylfaen"/>
+      </a:minorFont>
+    </a:fontScheme>
+    <a:fmtScheme name="Office">
+      <a:fillStyleLst>
+        <a:solidFill>
+          <a:schemeClr val="phClr"/>
+        </a:solidFill>
+        <a:gradFill rotWithShape="1">
+          <a:gsLst>
+            <a:gs pos="0">
+              <a:schemeClr val="phClr">
+                <a:lumMod val="110000"/>
+                <a:satMod val="105000"/>
+                <a:tint val="67000"/>
+              </a:schemeClr>
+            </a:gs>
+            <a:gs pos="50000">
+              <a:schemeClr val="phClr">
+                <a:lumMod val="105000"/>
+                <a:satMod val="103000"/>
+                <a:tint val="73000"/>
+              </a:schemeClr>
+            </a:gs>
+            <a:gs pos="100000">
+              <a:schemeClr val="phClr">
+                <a:lumMod val="105000"/>
+                <a:satMod val="109000"/>
+                <a:tint val="81000"/>
+              </a:schemeClr>
+            </a:gs>
+          </a:gsLst>
+          <a:lin ang="5400000" scaled="0"/>
+        </a:gradFill>
+        <a:gradFill rotWithShape="1">
+          <a:gsLst>
+            <a:gs pos="0">
+              <a:schemeClr val="phClr">
+                <a:satMod val="103000"/>
+                <a:lumMod val="102000"/>
+                <a:tint val="94000"/>
+              </a:schemeClr>
+            </a:gs>
+            <a:gs pos="50000">
+              <a:schemeClr val="phClr">
+                <a:satMod val="110000"/>
+                <a:lumMod val="100000"/>
+                <a:shade val="100000"/>
+              </a:schemeClr>
+            </a:gs>
+            <a:gs pos="100000">
+              <a:schemeClr val="phClr">
+                <a:lumMod val="99000"/>
+                <a:satMod val="120000"/>
+                <a:shade val="78000"/>
+              </a:schemeClr>
+            </a:gs>
+          </a:gsLst>
+          <a:lin ang="5400000" scaled="0"/>
+        </a:gradFill>
+      </a:fillStyleLst>
+      <a:lnStyleLst>
+        <a:ln w="6350" cap="flat" cmpd="sng" algn="ctr">
+          <a:solidFill>
+            <a:schemeClr val="phClr"/>
+          </a:solidFill>
+          <a:prstDash val="solid"/>
+          <a:miter lim="800000"/>
+        </a:ln>
+        <a:ln w="12700" cap="flat" cmpd="sng" algn="ctr">
+          <a:solidFill>
+            <a:schemeClr val="phClr"/>
+          </a:solidFill>
+          <a:prstDash val="solid"/>
+          <a:miter lim="800000"/>
+        </a:ln>
+        <a:ln w="19050" cap="flat" cmpd="sng" algn="ctr">
+          <a:solidFill>
+            <a:schemeClr val="phClr"/>
+          </a:solidFill>
+          <a:prstDash val="solid"/>
+          <a:miter lim="800000"/>
+        </a:ln>
+      </a:lnStyleLst>
+      <a:effectStyleLst>
+        <a:effectStyle>
+          <a:effectLst/>
+        </a:effectStyle>
+        <a:effectStyle>
+          <a:effectLst/>
+        </a:effectStyle>
+        <a:effectStyle>
+          <a:effectLst>
+            <a:outerShdw blurRad="57150" dist="19050" dir="5400000" algn="ctr" rotWithShape="0">
+              <a:srgbClr val="000000">
+                <a:alpha val="63000"/>
+              </a:srgbClr>
+            </a:outerShdw>
+          </a:effectLst>
+        </a:effectStyle>
+      </a:effectStyleLst>
+      <a:bgFillStyleLst>
+        <a:solidFill>
+          <a:schemeClr val="phClr"/>
+        </a:solidFill>
+        <a:solidFill>
+          <a:schemeClr val="phClr">
+            <a:tint val="95000"/>
+            <a:satMod val="170000"/>
+          </a:schemeClr>
+        </a:solidFill>
+        <a:gradFill rotWithShape="1">
+          <a:gsLst>
+            <a:gs pos="0">
+              <a:schemeClr val="phClr">
+                <a:tint val="93000"/>
+                <a:satMod val="150000"/>
+                <a:shade val="98000"/>
+                <a:lumMod val="102000"/>
+              </a:schemeClr>
+            </a:gs>
+            <a:gs pos="50000">
+              <a:schemeClr val="phClr">
+                <a:tint val="98000"/>
+                <a:satMod val="130000"/>
+                <a:shade val="90000"/>
+                <a:lumMod val="103000"/>
+              </a:schemeClr>
+            </a:gs>
+            <a:gs pos="100000">
+              <a:schemeClr val="phClr">
+                <a:shade val="63000"/>
+                <a:satMod val="120000"/>
+              </a:schemeClr>
+            </a:gs>
+          </a:gsLst>
+          <a:lin ang="5400000" scaled="0"/>
+        </a:gradFill>
+      </a:bgFillStyleLst>
+    </a:fmtScheme>
+  </a:themeElements>
+  <a:objectDefaults/>
+  <a:extraClrSchemeLst/>
+  <a:extLst>
+    <a:ext uri="{05A4C25C-085E-4340-85A3-A5531E510DB2}">
+      <thm15:themeFamily xmlns:thm15="http://schemas.microsoft.com/office/thememl/2012/main" name="Office Theme" id="{62F939B6-93AF-4DB8-9C6B-D6C7DFDC589F}" vid="{4A3C46E8-61CC-4603-A589-7422A47A8E4A}"/>
+    </a:ext>
+  </a:extLst>
+</a:theme>
 </file>
</xml_diff>

<commit_message>
a few fixes and improvements
</commit_message>
<xml_diff>
--- a/images/instructions/instructions.pptx
+++ b/images/instructions/instructions.pptx
@@ -5,7 +5,7 @@
     <p:sldMasterId id="2147483660" r:id="rId1"/>
   </p:sldMasterIdLst>
   <p:notesMasterIdLst>
-    <p:notesMasterId r:id="rId13"/>
+    <p:notesMasterId r:id="rId16"/>
   </p:notesMasterIdLst>
   <p:sldIdLst>
     <p:sldId id="256" r:id="rId2"/>
@@ -17,8 +17,11 @@
     <p:sldId id="259" r:id="rId8"/>
     <p:sldId id="265" r:id="rId9"/>
     <p:sldId id="266" r:id="rId10"/>
-    <p:sldId id="260" r:id="rId11"/>
-    <p:sldId id="261" r:id="rId12"/>
+    <p:sldId id="261" r:id="rId11"/>
+    <p:sldId id="260" r:id="rId12"/>
+    <p:sldId id="267" r:id="rId13"/>
+    <p:sldId id="268" r:id="rId14"/>
+    <p:sldId id="269" r:id="rId15"/>
   </p:sldIdLst>
   <p:sldSz cx="9144000" cy="6858000" type="screen4x3"/>
   <p:notesSz cx="6858000" cy="9144000"/>
@@ -132,6 +135,9 @@
         </p15:guide>
       </p15:sldGuideLst>
     </p:ext>
+    <p:ext uri="{2D200454-40CA-4A62-9FC3-DE9A4176ACB9}">
+      <p15:notesGuideLst xmlns:p15="http://schemas.microsoft.com/office/powerpoint/2012/main"/>
+    </p:ext>
   </p:extLst>
 </p:presentation>
 </file>
@@ -218,7 +224,7 @@
           <a:p>
             <a:fld id="{BACB0B72-BBCE-4794-A7EC-CF45B082918D}" type="datetimeFigureOut">
               <a:rPr lang="en-CA" smtClean="0"/>
-              <a:t>21/03/2018</a:t>
+              <a:t>22/03/2018</a:t>
             </a:fld>
             <a:endParaRPr lang="en-CA"/>
           </a:p>
@@ -617,7 +623,7 @@
           <a:p>
             <a:fld id="{E4A4F39D-5229-437F-8485-17CB22BA73AE}" type="datetimeFigureOut">
               <a:rPr lang="en-CA" smtClean="0"/>
-              <a:t>21/03/2018</a:t>
+              <a:t>22/03/2018</a:t>
             </a:fld>
             <a:endParaRPr lang="en-CA"/>
           </a:p>
@@ -787,7 +793,7 @@
           <a:p>
             <a:fld id="{E4A4F39D-5229-437F-8485-17CB22BA73AE}" type="datetimeFigureOut">
               <a:rPr lang="en-CA" smtClean="0"/>
-              <a:t>21/03/2018</a:t>
+              <a:t>22/03/2018</a:t>
             </a:fld>
             <a:endParaRPr lang="en-CA"/>
           </a:p>
@@ -967,7 +973,7 @@
           <a:p>
             <a:fld id="{E4A4F39D-5229-437F-8485-17CB22BA73AE}" type="datetimeFigureOut">
               <a:rPr lang="en-CA" smtClean="0"/>
-              <a:t>21/03/2018</a:t>
+              <a:t>22/03/2018</a:t>
             </a:fld>
             <a:endParaRPr lang="en-CA"/>
           </a:p>
@@ -1137,7 +1143,7 @@
           <a:p>
             <a:fld id="{E4A4F39D-5229-437F-8485-17CB22BA73AE}" type="datetimeFigureOut">
               <a:rPr lang="en-CA" smtClean="0"/>
-              <a:t>21/03/2018</a:t>
+              <a:t>22/03/2018</a:t>
             </a:fld>
             <a:endParaRPr lang="en-CA"/>
           </a:p>
@@ -1381,7 +1387,7 @@
           <a:p>
             <a:fld id="{E4A4F39D-5229-437F-8485-17CB22BA73AE}" type="datetimeFigureOut">
               <a:rPr lang="en-CA" smtClean="0"/>
-              <a:t>21/03/2018</a:t>
+              <a:t>22/03/2018</a:t>
             </a:fld>
             <a:endParaRPr lang="en-CA"/>
           </a:p>
@@ -1613,7 +1619,7 @@
           <a:p>
             <a:fld id="{E4A4F39D-5229-437F-8485-17CB22BA73AE}" type="datetimeFigureOut">
               <a:rPr lang="en-CA" smtClean="0"/>
-              <a:t>21/03/2018</a:t>
+              <a:t>22/03/2018</a:t>
             </a:fld>
             <a:endParaRPr lang="en-CA"/>
           </a:p>
@@ -1980,7 +1986,7 @@
           <a:p>
             <a:fld id="{E4A4F39D-5229-437F-8485-17CB22BA73AE}" type="datetimeFigureOut">
               <a:rPr lang="en-CA" smtClean="0"/>
-              <a:t>21/03/2018</a:t>
+              <a:t>22/03/2018</a:t>
             </a:fld>
             <a:endParaRPr lang="en-CA"/>
           </a:p>
@@ -2098,7 +2104,7 @@
           <a:p>
             <a:fld id="{E4A4F39D-5229-437F-8485-17CB22BA73AE}" type="datetimeFigureOut">
               <a:rPr lang="en-CA" smtClean="0"/>
-              <a:t>21/03/2018</a:t>
+              <a:t>22/03/2018</a:t>
             </a:fld>
             <a:endParaRPr lang="en-CA"/>
           </a:p>
@@ -2193,7 +2199,7 @@
           <a:p>
             <a:fld id="{E4A4F39D-5229-437F-8485-17CB22BA73AE}" type="datetimeFigureOut">
               <a:rPr lang="en-CA" smtClean="0"/>
-              <a:t>21/03/2018</a:t>
+              <a:t>22/03/2018</a:t>
             </a:fld>
             <a:endParaRPr lang="en-CA"/>
           </a:p>
@@ -2470,7 +2476,7 @@
           <a:p>
             <a:fld id="{E4A4F39D-5229-437F-8485-17CB22BA73AE}" type="datetimeFigureOut">
               <a:rPr lang="en-CA" smtClean="0"/>
-              <a:t>21/03/2018</a:t>
+              <a:t>22/03/2018</a:t>
             </a:fld>
             <a:endParaRPr lang="en-CA"/>
           </a:p>
@@ -2727,7 +2733,7 @@
           <a:p>
             <a:fld id="{E4A4F39D-5229-437F-8485-17CB22BA73AE}" type="datetimeFigureOut">
               <a:rPr lang="en-CA" smtClean="0"/>
-              <a:t>21/03/2018</a:t>
+              <a:t>22/03/2018</a:t>
             </a:fld>
             <a:endParaRPr lang="en-CA"/>
           </a:p>
@@ -2940,7 +2946,7 @@
           <a:p>
             <a:fld id="{E4A4F39D-5229-437F-8485-17CB22BA73AE}" type="datetimeFigureOut">
               <a:rPr lang="en-CA" smtClean="0"/>
-              <a:t>21/03/2018</a:t>
+              <a:t>22/03/2018</a:t>
             </a:fld>
             <a:endParaRPr lang="en-CA"/>
           </a:p>
@@ -3498,7 +3504,47 @@
                 <a:latin typeface="Arial" panose="020B0604020202020204" pitchFamily="34" charset="0"/>
                 <a:cs typeface="Arial" panose="020B0604020202020204" pitchFamily="34" charset="0"/>
               </a:rPr>
-              <a:t>On each trial you will be presented with a letter stimulus.  In these trials, please focus on the big letter on the screen.  Upon stimulus presentation, indicate as </a:t>
+              <a:t>On each trial you will be presented with a letter stimulus.  In these trials, please focus on </a:t>
+            </a:r>
+            <a:r>
+              <a:rPr lang="en-CA" dirty="0" smtClean="0">
+                <a:solidFill>
+                  <a:schemeClr val="bg1"/>
+                </a:solidFill>
+                <a:latin typeface="Arial" panose="020B0604020202020204" pitchFamily="34" charset="0"/>
+                <a:cs typeface="Arial" panose="020B0604020202020204" pitchFamily="34" charset="0"/>
+              </a:rPr>
+              <a:t>either small or big letters on </a:t>
+            </a:r>
+            <a:r>
+              <a:rPr lang="en-CA" dirty="0">
+                <a:solidFill>
+                  <a:schemeClr val="bg1"/>
+                </a:solidFill>
+                <a:latin typeface="Arial" panose="020B0604020202020204" pitchFamily="34" charset="0"/>
+                <a:cs typeface="Arial" panose="020B0604020202020204" pitchFamily="34" charset="0"/>
+              </a:rPr>
+              <a:t>the </a:t>
+            </a:r>
+            <a:r>
+              <a:rPr lang="en-CA" dirty="0" smtClean="0">
+                <a:solidFill>
+                  <a:schemeClr val="bg1"/>
+                </a:solidFill>
+                <a:latin typeface="Arial" panose="020B0604020202020204" pitchFamily="34" charset="0"/>
+                <a:cs typeface="Arial" panose="020B0604020202020204" pitchFamily="34" charset="0"/>
+              </a:rPr>
+              <a:t>screen. Upon </a:t>
+            </a:r>
+            <a:r>
+              <a:rPr lang="en-CA" dirty="0">
+                <a:solidFill>
+                  <a:schemeClr val="bg1"/>
+                </a:solidFill>
+                <a:latin typeface="Arial" panose="020B0604020202020204" pitchFamily="34" charset="0"/>
+                <a:cs typeface="Arial" panose="020B0604020202020204" pitchFamily="34" charset="0"/>
+              </a:rPr>
+              <a:t>stimulus presentation, indicate </a:t>
             </a:r>
             <a:r>
               <a:rPr lang="en-CA" i="1" dirty="0">
@@ -3508,7 +3554,7 @@
                 <a:latin typeface="Arial" panose="020B0604020202020204" pitchFamily="34" charset="0"/>
                 <a:cs typeface="Arial" panose="020B0604020202020204" pitchFamily="34" charset="0"/>
               </a:rPr>
-              <a:t>quickly and accurately </a:t>
+              <a:t>as quickly and accurately</a:t>
             </a:r>
             <a:r>
               <a:rPr lang="en-CA" dirty="0">
@@ -3518,7 +3564,57 @@
                 <a:latin typeface="Arial" panose="020B0604020202020204" pitchFamily="34" charset="0"/>
                 <a:cs typeface="Arial" panose="020B0604020202020204" pitchFamily="34" charset="0"/>
               </a:rPr>
-              <a:t>as possible the big letter you saw using the left and right arrow keys corresponding to your response.</a:t>
+              <a:t> as possible </a:t>
+            </a:r>
+            <a:r>
+              <a:rPr lang="en-CA" dirty="0" smtClean="0">
+                <a:solidFill>
+                  <a:schemeClr val="bg1"/>
+                </a:solidFill>
+                <a:latin typeface="Arial" panose="020B0604020202020204" pitchFamily="34" charset="0"/>
+                <a:cs typeface="Arial" panose="020B0604020202020204" pitchFamily="34" charset="0"/>
+              </a:rPr>
+              <a:t>the letter </a:t>
+            </a:r>
+            <a:r>
+              <a:rPr lang="en-CA" dirty="0">
+                <a:solidFill>
+                  <a:schemeClr val="bg1"/>
+                </a:solidFill>
+                <a:latin typeface="Arial" panose="020B0604020202020204" pitchFamily="34" charset="0"/>
+                <a:cs typeface="Arial" panose="020B0604020202020204" pitchFamily="34" charset="0"/>
+              </a:rPr>
+              <a:t>you saw using the left </a:t>
+            </a:r>
+            <a:r>
+              <a:rPr lang="en-CA" dirty="0" smtClean="0">
+                <a:solidFill>
+                  <a:schemeClr val="bg1"/>
+                </a:solidFill>
+                <a:latin typeface="Arial" panose="020B0604020202020204" pitchFamily="34" charset="0"/>
+                <a:cs typeface="Arial" panose="020B0604020202020204" pitchFamily="34" charset="0"/>
+              </a:rPr>
+              <a:t>or</a:t>
+            </a:r>
+            <a:r>
+              <a:rPr lang="en-CA" dirty="0" smtClean="0">
+                <a:solidFill>
+                  <a:schemeClr val="bg1"/>
+                </a:solidFill>
+                <a:latin typeface="Arial" panose="020B0604020202020204" pitchFamily="34" charset="0"/>
+                <a:cs typeface="Arial" panose="020B0604020202020204" pitchFamily="34" charset="0"/>
+              </a:rPr>
+              <a:t> </a:t>
+            </a:r>
+            <a:r>
+              <a:rPr lang="en-CA" dirty="0">
+                <a:solidFill>
+                  <a:schemeClr val="bg1"/>
+                </a:solidFill>
+                <a:latin typeface="Arial" panose="020B0604020202020204" pitchFamily="34" charset="0"/>
+                <a:cs typeface="Arial" panose="020B0604020202020204" pitchFamily="34" charset="0"/>
+              </a:rPr>
+              <a:t>right arrow keys corresponding to your response.</a:t>
             </a:r>
           </a:p>
           <a:p>
@@ -3559,7 +3655,7 @@
     </p:spTree>
     <p:extLst>
       <p:ext uri="{BB962C8B-B14F-4D97-AF65-F5344CB8AC3E}">
-        <p14:creationId xmlns:p14="http://schemas.microsoft.com/office/powerpoint/2010/main" val="4067659435"/>
+        <p14:creationId xmlns:p14="http://schemas.microsoft.com/office/powerpoint/2010/main" val="1268726990"/>
       </p:ext>
     </p:extLst>
   </p:cSld>
@@ -3602,8 +3698,8 @@
         </p:nvSpPr>
         <p:spPr>
           <a:xfrm>
-            <a:off x="381817" y="2413338"/>
-            <a:ext cx="8380366" cy="2031325"/>
+            <a:off x="381817" y="2828836"/>
+            <a:ext cx="8380366" cy="1200329"/>
           </a:xfrm>
           <a:prstGeom prst="rect">
             <a:avLst/>
@@ -3618,35 +3714,22 @@
           <a:p>
             <a:pPr algn="ctr"/>
             <a:r>
-              <a:rPr lang="en-CA" dirty="0">
-                <a:solidFill>
-                  <a:schemeClr val="bg1"/>
-                </a:solidFill>
-                <a:latin typeface="Arial" panose="020B0604020202020204" pitchFamily="34" charset="0"/>
-                <a:cs typeface="Arial" panose="020B0604020202020204" pitchFamily="34" charset="0"/>
-              </a:rPr>
-              <a:t>On each trial you will be presented with a letter stimulus.  In these trials, please focus on the small letters on the screen.  Upon stimulus presentation, indicate </a:t>
-            </a:r>
-            <a:r>
-              <a:rPr lang="en-CA" i="1" dirty="0">
-                <a:solidFill>
-                  <a:schemeClr val="bg1"/>
-                </a:solidFill>
-                <a:latin typeface="Arial" panose="020B0604020202020204" pitchFamily="34" charset="0"/>
-                <a:cs typeface="Arial" panose="020B0604020202020204" pitchFamily="34" charset="0"/>
-              </a:rPr>
-              <a:t>as quickly and accurately</a:t>
-            </a:r>
-            <a:r>
-              <a:rPr lang="en-CA" dirty="0">
-                <a:solidFill>
-                  <a:schemeClr val="bg1"/>
-                </a:solidFill>
-                <a:latin typeface="Arial" panose="020B0604020202020204" pitchFamily="34" charset="0"/>
-                <a:cs typeface="Arial" panose="020B0604020202020204" pitchFamily="34" charset="0"/>
-              </a:rPr>
-              <a:t> as possible the small letters you saw using the left and right arrow keys corresponding to your response.</a:t>
-            </a:r>
+              <a:rPr lang="en-CA" dirty="0" smtClean="0">
+                <a:solidFill>
+                  <a:schemeClr val="bg1"/>
+                </a:solidFill>
+                <a:latin typeface="Arial" panose="020B0604020202020204" pitchFamily="34" charset="0"/>
+                <a:cs typeface="Arial" panose="020B0604020202020204" pitchFamily="34" charset="0"/>
+              </a:rPr>
+              <a:t>The first 6 trials are for practice. Please concentrate on the small letters.</a:t>
+            </a:r>
+            <a:endParaRPr lang="en-CA" dirty="0">
+              <a:solidFill>
+                <a:schemeClr val="bg1"/>
+              </a:solidFill>
+              <a:latin typeface="Arial" panose="020B0604020202020204" pitchFamily="34" charset="0"/>
+              <a:cs typeface="Arial" panose="020B0604020202020204" pitchFamily="34" charset="0"/>
+            </a:endParaRPr>
           </a:p>
           <a:p>
             <a:pPr algn="ctr"/>
@@ -3686,7 +3769,389 @@
     </p:spTree>
     <p:extLst>
       <p:ext uri="{BB962C8B-B14F-4D97-AF65-F5344CB8AC3E}">
-        <p14:creationId xmlns:p14="http://schemas.microsoft.com/office/powerpoint/2010/main" val="1268726990"/>
+        <p14:creationId xmlns:p14="http://schemas.microsoft.com/office/powerpoint/2010/main" val="4067659435"/>
+      </p:ext>
+    </p:extLst>
+  </p:cSld>
+  <p:clrMapOvr>
+    <a:masterClrMapping/>
+  </p:clrMapOvr>
+</p:sld>
+</file>
+
+<file path=ppt/slides/slide12.xml><?xml version="1.0" encoding="utf-8"?>
+<p:sld xmlns:a="http://schemas.openxmlformats.org/drawingml/2006/main" xmlns:r="http://schemas.openxmlformats.org/officeDocument/2006/relationships" xmlns:p="http://schemas.openxmlformats.org/presentationml/2006/main">
+  <p:cSld>
+    <p:bg>
+      <p:bgPr>
+        <a:solidFill>
+          <a:srgbClr val="808080"/>
+        </a:solidFill>
+        <a:effectLst/>
+      </p:bgPr>
+    </p:bg>
+    <p:spTree>
+      <p:nvGrpSpPr>
+        <p:cNvPr id="1" name=""/>
+        <p:cNvGrpSpPr/>
+        <p:nvPr/>
+      </p:nvGrpSpPr>
+      <p:grpSpPr>
+        <a:xfrm>
+          <a:off x="0" y="0"/>
+          <a:ext cx="0" cy="0"/>
+          <a:chOff x="0" y="0"/>
+          <a:chExt cx="0" cy="0"/>
+        </a:xfrm>
+      </p:grpSpPr>
+      <p:sp>
+        <p:nvSpPr>
+          <p:cNvPr id="4" name="TextBox 3"/>
+          <p:cNvSpPr txBox="1"/>
+          <p:nvPr/>
+        </p:nvSpPr>
+        <p:spPr>
+          <a:xfrm>
+            <a:off x="381817" y="2828836"/>
+            <a:ext cx="8380366" cy="1200329"/>
+          </a:xfrm>
+          <a:prstGeom prst="rect">
+            <a:avLst/>
+          </a:prstGeom>
+          <a:noFill/>
+        </p:spPr>
+        <p:txBody>
+          <a:bodyPr wrap="square" rtlCol="0">
+            <a:spAutoFit/>
+          </a:bodyPr>
+          <a:lstStyle/>
+          <a:p>
+            <a:pPr algn="ctr"/>
+            <a:r>
+              <a:rPr lang="en-CA" dirty="0" smtClean="0">
+                <a:solidFill>
+                  <a:schemeClr val="bg1"/>
+                </a:solidFill>
+                <a:latin typeface="Arial" panose="020B0604020202020204" pitchFamily="34" charset="0"/>
+                <a:cs typeface="Arial" panose="020B0604020202020204" pitchFamily="34" charset="0"/>
+              </a:rPr>
+              <a:t>The next 6 </a:t>
+            </a:r>
+            <a:r>
+              <a:rPr lang="en-CA" smtClean="0">
+                <a:solidFill>
+                  <a:schemeClr val="bg1"/>
+                </a:solidFill>
+                <a:latin typeface="Arial" panose="020B0604020202020204" pitchFamily="34" charset="0"/>
+                <a:cs typeface="Arial" panose="020B0604020202020204" pitchFamily="34" charset="0"/>
+              </a:rPr>
+              <a:t>trials are also </a:t>
+            </a:r>
+            <a:r>
+              <a:rPr lang="en-CA" dirty="0" smtClean="0">
+                <a:solidFill>
+                  <a:schemeClr val="bg1"/>
+                </a:solidFill>
+                <a:latin typeface="Arial" panose="020B0604020202020204" pitchFamily="34" charset="0"/>
+                <a:cs typeface="Arial" panose="020B0604020202020204" pitchFamily="34" charset="0"/>
+              </a:rPr>
+              <a:t>for practice. Please concentrate on the big letters.</a:t>
+            </a:r>
+            <a:endParaRPr lang="en-CA" dirty="0">
+              <a:solidFill>
+                <a:schemeClr val="bg1"/>
+              </a:solidFill>
+              <a:latin typeface="Arial" panose="020B0604020202020204" pitchFamily="34" charset="0"/>
+              <a:cs typeface="Arial" panose="020B0604020202020204" pitchFamily="34" charset="0"/>
+            </a:endParaRPr>
+          </a:p>
+          <a:p>
+            <a:pPr algn="ctr"/>
+            <a:endParaRPr lang="en-CA" dirty="0" smtClean="0">
+              <a:solidFill>
+                <a:schemeClr val="bg1"/>
+              </a:solidFill>
+              <a:latin typeface="Arial" panose="020B0604020202020204" pitchFamily="34" charset="0"/>
+              <a:cs typeface="Arial" panose="020B0604020202020204" pitchFamily="34" charset="0"/>
+            </a:endParaRPr>
+          </a:p>
+          <a:p>
+            <a:pPr algn="ctr"/>
+            <a:endParaRPr lang="en-CA" dirty="0">
+              <a:solidFill>
+                <a:schemeClr val="bg1"/>
+              </a:solidFill>
+              <a:latin typeface="Arial" panose="020B0604020202020204" pitchFamily="34" charset="0"/>
+              <a:cs typeface="Arial" panose="020B0604020202020204" pitchFamily="34" charset="0"/>
+            </a:endParaRPr>
+          </a:p>
+          <a:p>
+            <a:pPr algn="ctr"/>
+            <a:r>
+              <a:rPr lang="en-CA" dirty="0">
+                <a:solidFill>
+                  <a:schemeClr val="bg1"/>
+                </a:solidFill>
+                <a:latin typeface="Arial" panose="020B0604020202020204" pitchFamily="34" charset="0"/>
+                <a:cs typeface="Arial" panose="020B0604020202020204" pitchFamily="34" charset="0"/>
+              </a:rPr>
+              <a:t>Press the spacebar to begin</a:t>
+            </a:r>
+          </a:p>
+        </p:txBody>
+      </p:sp>
+    </p:spTree>
+    <p:extLst>
+      <p:ext uri="{BB962C8B-B14F-4D97-AF65-F5344CB8AC3E}">
+        <p14:creationId xmlns:p14="http://schemas.microsoft.com/office/powerpoint/2010/main" val="159981504"/>
+      </p:ext>
+    </p:extLst>
+  </p:cSld>
+  <p:clrMapOvr>
+    <a:masterClrMapping/>
+  </p:clrMapOvr>
+</p:sld>
+</file>
+
+<file path=ppt/slides/slide13.xml><?xml version="1.0" encoding="utf-8"?>
+<p:sld xmlns:a="http://schemas.openxmlformats.org/drawingml/2006/main" xmlns:r="http://schemas.openxmlformats.org/officeDocument/2006/relationships" xmlns:p="http://schemas.openxmlformats.org/presentationml/2006/main">
+  <p:cSld>
+    <p:bg>
+      <p:bgPr>
+        <a:solidFill>
+          <a:srgbClr val="808080"/>
+        </a:solidFill>
+        <a:effectLst/>
+      </p:bgPr>
+    </p:bg>
+    <p:spTree>
+      <p:nvGrpSpPr>
+        <p:cNvPr id="1" name=""/>
+        <p:cNvGrpSpPr/>
+        <p:nvPr/>
+      </p:nvGrpSpPr>
+      <p:grpSpPr>
+        <a:xfrm>
+          <a:off x="0" y="0"/>
+          <a:ext cx="0" cy="0"/>
+          <a:chOff x="0" y="0"/>
+          <a:chExt cx="0" cy="0"/>
+        </a:xfrm>
+      </p:grpSpPr>
+      <p:sp>
+        <p:nvSpPr>
+          <p:cNvPr id="4" name="TextBox 3"/>
+          <p:cNvSpPr txBox="1"/>
+          <p:nvPr/>
+        </p:nvSpPr>
+        <p:spPr>
+          <a:xfrm>
+            <a:off x="381817" y="2690336"/>
+            <a:ext cx="8380366" cy="1477328"/>
+          </a:xfrm>
+          <a:prstGeom prst="rect">
+            <a:avLst/>
+          </a:prstGeom>
+          <a:noFill/>
+        </p:spPr>
+        <p:txBody>
+          <a:bodyPr wrap="square" rtlCol="0">
+            <a:spAutoFit/>
+          </a:bodyPr>
+          <a:lstStyle/>
+          <a:p>
+            <a:pPr algn="ctr"/>
+            <a:r>
+              <a:rPr lang="en-CA" dirty="0" smtClean="0">
+                <a:solidFill>
+                  <a:schemeClr val="bg1"/>
+                </a:solidFill>
+                <a:latin typeface="Arial" panose="020B0604020202020204" pitchFamily="34" charset="0"/>
+                <a:cs typeface="Arial" panose="020B0604020202020204" pitchFamily="34" charset="0"/>
+              </a:rPr>
+              <a:t>The following 90 trials will be recorded. Please concentrate on the small letters and make a response as quickly and accurately as possible.</a:t>
+            </a:r>
+            <a:endParaRPr lang="en-CA" dirty="0">
+              <a:solidFill>
+                <a:schemeClr val="bg1"/>
+              </a:solidFill>
+              <a:latin typeface="Arial" panose="020B0604020202020204" pitchFamily="34" charset="0"/>
+              <a:cs typeface="Arial" panose="020B0604020202020204" pitchFamily="34" charset="0"/>
+            </a:endParaRPr>
+          </a:p>
+          <a:p>
+            <a:pPr algn="ctr"/>
+            <a:endParaRPr lang="en-CA" dirty="0" smtClean="0">
+              <a:solidFill>
+                <a:schemeClr val="bg1"/>
+              </a:solidFill>
+              <a:latin typeface="Arial" panose="020B0604020202020204" pitchFamily="34" charset="0"/>
+              <a:cs typeface="Arial" panose="020B0604020202020204" pitchFamily="34" charset="0"/>
+            </a:endParaRPr>
+          </a:p>
+          <a:p>
+            <a:pPr algn="ctr"/>
+            <a:endParaRPr lang="en-CA" dirty="0">
+              <a:solidFill>
+                <a:schemeClr val="bg1"/>
+              </a:solidFill>
+              <a:latin typeface="Arial" panose="020B0604020202020204" pitchFamily="34" charset="0"/>
+              <a:cs typeface="Arial" panose="020B0604020202020204" pitchFamily="34" charset="0"/>
+            </a:endParaRPr>
+          </a:p>
+          <a:p>
+            <a:pPr algn="ctr"/>
+            <a:r>
+              <a:rPr lang="en-CA" dirty="0">
+                <a:solidFill>
+                  <a:schemeClr val="bg1"/>
+                </a:solidFill>
+                <a:latin typeface="Arial" panose="020B0604020202020204" pitchFamily="34" charset="0"/>
+                <a:cs typeface="Arial" panose="020B0604020202020204" pitchFamily="34" charset="0"/>
+              </a:rPr>
+              <a:t>Press the spacebar to begin</a:t>
+            </a:r>
+          </a:p>
+        </p:txBody>
+      </p:sp>
+    </p:spTree>
+    <p:extLst>
+      <p:ext uri="{BB962C8B-B14F-4D97-AF65-F5344CB8AC3E}">
+        <p14:creationId xmlns:p14="http://schemas.microsoft.com/office/powerpoint/2010/main" val="2152398145"/>
+      </p:ext>
+    </p:extLst>
+  </p:cSld>
+  <p:clrMapOvr>
+    <a:masterClrMapping/>
+  </p:clrMapOvr>
+</p:sld>
+</file>
+
+<file path=ppt/slides/slide14.xml><?xml version="1.0" encoding="utf-8"?>
+<p:sld xmlns:a="http://schemas.openxmlformats.org/drawingml/2006/main" xmlns:r="http://schemas.openxmlformats.org/officeDocument/2006/relationships" xmlns:p="http://schemas.openxmlformats.org/presentationml/2006/main">
+  <p:cSld>
+    <p:bg>
+      <p:bgPr>
+        <a:solidFill>
+          <a:srgbClr val="808080"/>
+        </a:solidFill>
+        <a:effectLst/>
+      </p:bgPr>
+    </p:bg>
+    <p:spTree>
+      <p:nvGrpSpPr>
+        <p:cNvPr id="1" name=""/>
+        <p:cNvGrpSpPr/>
+        <p:nvPr/>
+      </p:nvGrpSpPr>
+      <p:grpSpPr>
+        <a:xfrm>
+          <a:off x="0" y="0"/>
+          <a:ext cx="0" cy="0"/>
+          <a:chOff x="0" y="0"/>
+          <a:chExt cx="0" cy="0"/>
+        </a:xfrm>
+      </p:grpSpPr>
+      <p:sp>
+        <p:nvSpPr>
+          <p:cNvPr id="4" name="TextBox 3"/>
+          <p:cNvSpPr txBox="1"/>
+          <p:nvPr/>
+        </p:nvSpPr>
+        <p:spPr>
+          <a:xfrm>
+            <a:off x="381817" y="2690336"/>
+            <a:ext cx="8380366" cy="1477328"/>
+          </a:xfrm>
+          <a:prstGeom prst="rect">
+            <a:avLst/>
+          </a:prstGeom>
+          <a:noFill/>
+        </p:spPr>
+        <p:txBody>
+          <a:bodyPr wrap="square" rtlCol="0">
+            <a:spAutoFit/>
+          </a:bodyPr>
+          <a:lstStyle/>
+          <a:p>
+            <a:pPr algn="ctr"/>
+            <a:r>
+              <a:rPr lang="en-CA" dirty="0">
+                <a:solidFill>
+                  <a:schemeClr val="bg1"/>
+                </a:solidFill>
+                <a:latin typeface="Arial" panose="020B0604020202020204" pitchFamily="34" charset="0"/>
+                <a:cs typeface="Arial" panose="020B0604020202020204" pitchFamily="34" charset="0"/>
+              </a:rPr>
+              <a:t>The following 90 trials will be recorded. Please concentrate on the </a:t>
+            </a:r>
+            <a:r>
+              <a:rPr lang="en-CA" dirty="0" smtClean="0">
+                <a:solidFill>
+                  <a:schemeClr val="bg1"/>
+                </a:solidFill>
+                <a:latin typeface="Arial" panose="020B0604020202020204" pitchFamily="34" charset="0"/>
+                <a:cs typeface="Arial" panose="020B0604020202020204" pitchFamily="34" charset="0"/>
+              </a:rPr>
+              <a:t>big </a:t>
+            </a:r>
+            <a:r>
+              <a:rPr lang="en-CA" dirty="0">
+                <a:solidFill>
+                  <a:schemeClr val="bg1"/>
+                </a:solidFill>
+                <a:latin typeface="Arial" panose="020B0604020202020204" pitchFamily="34" charset="0"/>
+                <a:cs typeface="Arial" panose="020B0604020202020204" pitchFamily="34" charset="0"/>
+              </a:rPr>
+              <a:t>letters and make a response as quickly and accurately as possible.</a:t>
+            </a:r>
+          </a:p>
+          <a:p>
+            <a:pPr algn="ctr"/>
+            <a:endParaRPr lang="en-CA" dirty="0">
+              <a:solidFill>
+                <a:schemeClr val="bg1"/>
+              </a:solidFill>
+              <a:latin typeface="Arial" panose="020B0604020202020204" pitchFamily="34" charset="0"/>
+              <a:cs typeface="Arial" panose="020B0604020202020204" pitchFamily="34" charset="0"/>
+            </a:endParaRPr>
+          </a:p>
+          <a:p>
+            <a:pPr algn="ctr"/>
+            <a:endParaRPr lang="en-CA" dirty="0">
+              <a:solidFill>
+                <a:schemeClr val="bg1"/>
+              </a:solidFill>
+              <a:latin typeface="Arial" panose="020B0604020202020204" pitchFamily="34" charset="0"/>
+              <a:cs typeface="Arial" panose="020B0604020202020204" pitchFamily="34" charset="0"/>
+            </a:endParaRPr>
+          </a:p>
+          <a:p>
+            <a:pPr algn="ctr"/>
+            <a:r>
+              <a:rPr lang="en-CA" dirty="0">
+                <a:solidFill>
+                  <a:schemeClr val="bg1"/>
+                </a:solidFill>
+                <a:latin typeface="Arial" panose="020B0604020202020204" pitchFamily="34" charset="0"/>
+                <a:cs typeface="Arial" panose="020B0604020202020204" pitchFamily="34" charset="0"/>
+              </a:rPr>
+              <a:t>Press the spacebar to begin</a:t>
+            </a:r>
+            <a:endParaRPr lang="en-CA" dirty="0">
+              <a:solidFill>
+                <a:schemeClr val="bg1"/>
+              </a:solidFill>
+              <a:latin typeface="Arial" panose="020B0604020202020204" pitchFamily="34" charset="0"/>
+              <a:cs typeface="Arial" panose="020B0604020202020204" pitchFamily="34" charset="0"/>
+            </a:endParaRPr>
+          </a:p>
+        </p:txBody>
+      </p:sp>
+    </p:spTree>
+    <p:extLst>
+      <p:ext uri="{BB962C8B-B14F-4D97-AF65-F5344CB8AC3E}">
+        <p14:creationId xmlns:p14="http://schemas.microsoft.com/office/powerpoint/2010/main" val="2441711739"/>
       </p:ext>
     </p:extLst>
   </p:cSld>
@@ -4085,17 +4550,7 @@
                 <a:latin typeface="Arial" panose="020B0604020202020204" pitchFamily="34" charset="0"/>
                 <a:cs typeface="Arial" panose="020B0604020202020204" pitchFamily="34" charset="0"/>
               </a:rPr>
-              <a:t>On the next set of trials, use up key to adjust the flicker</a:t>
-            </a:r>
-            <a:r>
-              <a:rPr lang="en-CA" dirty="0" smtClean="0">
-                <a:solidFill>
-                  <a:schemeClr val="bg1"/>
-                </a:solidFill>
-                <a:latin typeface="Arial" panose="020B0604020202020204" pitchFamily="34" charset="0"/>
-                <a:cs typeface="Arial" panose="020B0604020202020204" pitchFamily="34" charset="0"/>
-              </a:rPr>
-              <a:t>.</a:t>
+              <a:t>On the next set of trials, use up key to adjust the flicker.</a:t>
             </a:r>
           </a:p>
           <a:p>
@@ -4645,17 +5100,7 @@
                 <a:latin typeface="Arial" panose="020B0604020202020204" pitchFamily="34" charset="0"/>
                 <a:cs typeface="Arial" panose="020B0604020202020204" pitchFamily="34" charset="0"/>
               </a:rPr>
-              <a:t> </a:t>
-            </a:r>
-            <a:r>
-              <a:rPr lang="en-CA" dirty="0" smtClean="0">
-                <a:solidFill>
-                  <a:schemeClr val="bg1"/>
-                </a:solidFill>
-                <a:latin typeface="Arial" panose="020B0604020202020204" pitchFamily="34" charset="0"/>
-                <a:cs typeface="Arial" panose="020B0604020202020204" pitchFamily="34" charset="0"/>
-              </a:rPr>
-              <a:t>Present</a:t>
+              <a:t> Present</a:t>
             </a:r>
           </a:p>
           <a:p>
@@ -4762,7 +5207,27 @@
                 <a:latin typeface="Arial" panose="020B0604020202020204" pitchFamily="34" charset="0"/>
                 <a:cs typeface="Arial" panose="020B0604020202020204" pitchFamily="34" charset="0"/>
               </a:rPr>
-              <a:t>The first 12 trials are for practice</a:t>
+              <a:t>The first </a:t>
+            </a:r>
+            <a:r>
+              <a:rPr lang="en-CA" dirty="0" smtClean="0">
+                <a:solidFill>
+                  <a:schemeClr val="bg1"/>
+                </a:solidFill>
+                <a:latin typeface="Arial" panose="020B0604020202020204" pitchFamily="34" charset="0"/>
+                <a:cs typeface="Arial" panose="020B0604020202020204" pitchFamily="34" charset="0"/>
+              </a:rPr>
+              <a:t>6 </a:t>
+            </a:r>
+            <a:r>
+              <a:rPr lang="en-CA" dirty="0" smtClean="0">
+                <a:solidFill>
+                  <a:schemeClr val="bg1"/>
+                </a:solidFill>
+                <a:latin typeface="Arial" panose="020B0604020202020204" pitchFamily="34" charset="0"/>
+                <a:cs typeface="Arial" panose="020B0604020202020204" pitchFamily="34" charset="0"/>
+              </a:rPr>
+              <a:t>trials are for practice</a:t>
             </a:r>
             <a:endParaRPr lang="en-CA" dirty="0">
               <a:solidFill>

</xml_diff>